<commit_message>
commit excel essential updates
</commit_message>
<xml_diff>
--- a/ExcelEssentialSkills.pptx
+++ b/ExcelEssentialSkills.pptx
@@ -11,6 +11,9 @@
     <p:sldId id="259" r:id="rId5"/>
     <p:sldId id="260" r:id="rId6"/>
     <p:sldId id="261" r:id="rId7"/>
+    <p:sldId id="262" r:id="rId8"/>
+    <p:sldId id="263" r:id="rId9"/>
+    <p:sldId id="264" r:id="rId10"/>
   </p:sldIdLst>
   <p:sldSz cx="12192000" cy="6858000"/>
   <p:notesSz cx="6858000" cy="9144000"/>
@@ -4298,6 +4301,392 @@
 </p:sld>
 </file>
 
+<file path=ppt/slides/slide7.xml><?xml version="1.0" encoding="utf-8"?>
+<p:sld xmlns:a="http://schemas.openxmlformats.org/drawingml/2006/main" xmlns:r="http://schemas.openxmlformats.org/officeDocument/2006/relationships" xmlns:p="http://schemas.openxmlformats.org/presentationml/2006/main">
+  <p:cSld>
+    <p:spTree>
+      <p:nvGrpSpPr>
+        <p:cNvPr id="1" name=""/>
+        <p:cNvGrpSpPr/>
+        <p:nvPr/>
+      </p:nvGrpSpPr>
+      <p:grpSpPr>
+        <a:xfrm>
+          <a:off x="0" y="0"/>
+          <a:ext cx="0" cy="0"/>
+          <a:chOff x="0" y="0"/>
+          <a:chExt cx="0" cy="0"/>
+        </a:xfrm>
+      </p:grpSpPr>
+      <p:sp>
+        <p:nvSpPr>
+          <p:cNvPr id="2" name="Title 1">
+            <a:extLst>
+              <a:ext uri="{FF2B5EF4-FFF2-40B4-BE49-F238E27FC236}">
+                <a16:creationId xmlns:a16="http://schemas.microsoft.com/office/drawing/2014/main" id="{D5F96D59-C5F9-4CDF-BBA8-1E2736FB7659}"/>
+              </a:ext>
+            </a:extLst>
+          </p:cNvPr>
+          <p:cNvSpPr>
+            <a:spLocks noGrp="1"/>
+          </p:cNvSpPr>
+          <p:nvPr>
+            <p:ph type="title"/>
+          </p:nvPr>
+        </p:nvSpPr>
+        <p:spPr/>
+        <p:txBody>
+          <a:bodyPr/>
+          <a:lstStyle/>
+          <a:p>
+            <a:r>
+              <a:rPr lang="en-US" dirty="0"/>
+              <a:t>How to copy across sheets</a:t>
+            </a:r>
+          </a:p>
+        </p:txBody>
+      </p:sp>
+      <p:sp>
+        <p:nvSpPr>
+          <p:cNvPr id="3" name="Content Placeholder 2">
+            <a:extLst>
+              <a:ext uri="{FF2B5EF4-FFF2-40B4-BE49-F238E27FC236}">
+                <a16:creationId xmlns:a16="http://schemas.microsoft.com/office/drawing/2014/main" id="{9D56F638-5B99-4F48-8DF7-96FE7819DC9D}"/>
+              </a:ext>
+            </a:extLst>
+          </p:cNvPr>
+          <p:cNvSpPr>
+            <a:spLocks noGrp="1"/>
+          </p:cNvSpPr>
+          <p:nvPr>
+            <p:ph idx="1"/>
+          </p:nvPr>
+        </p:nvSpPr>
+        <p:spPr/>
+        <p:txBody>
+          <a:bodyPr/>
+          <a:lstStyle/>
+          <a:p>
+            <a:r>
+              <a:rPr lang="en-US" dirty="0"/>
+              <a:t>E.g. Copy data from sheet 1 to sheet 2</a:t>
+            </a:r>
+          </a:p>
+          <a:p>
+            <a:endParaRPr lang="en-US" dirty="0"/>
+          </a:p>
+          <a:p>
+            <a:r>
+              <a:rPr lang="en-US" dirty="0"/>
+              <a:t>Put “=“ in sheet 2 cell and go to sheet 1 select particular cell which contains the </a:t>
+            </a:r>
+            <a:r>
+              <a:rPr lang="en-US" dirty="0" err="1"/>
+              <a:t>infor</a:t>
+            </a:r>
+            <a:r>
+              <a:rPr lang="en-US" dirty="0"/>
+              <a:t> we want to copy over</a:t>
+            </a:r>
+          </a:p>
+          <a:p>
+            <a:endParaRPr lang="en-US" dirty="0"/>
+          </a:p>
+          <a:p>
+            <a:r>
+              <a:rPr lang="en-US" dirty="0"/>
+              <a:t>Press “Enter” while still in  </a:t>
+            </a:r>
+            <a:r>
+              <a:rPr lang="en-US" sz="3200" b="1" dirty="0"/>
+              <a:t>Sheet1</a:t>
+            </a:r>
+          </a:p>
+          <a:p>
+            <a:endParaRPr lang="en-US" dirty="0"/>
+          </a:p>
+        </p:txBody>
+      </p:sp>
+    </p:spTree>
+    <p:extLst>
+      <p:ext uri="{BB962C8B-B14F-4D97-AF65-F5344CB8AC3E}">
+        <p14:creationId xmlns:p14="http://schemas.microsoft.com/office/powerpoint/2010/main" val="2904951680"/>
+      </p:ext>
+    </p:extLst>
+  </p:cSld>
+  <p:clrMapOvr>
+    <a:masterClrMapping/>
+  </p:clrMapOvr>
+</p:sld>
+</file>
+
+<file path=ppt/slides/slide8.xml><?xml version="1.0" encoding="utf-8"?>
+<p:sld xmlns:a="http://schemas.openxmlformats.org/drawingml/2006/main" xmlns:r="http://schemas.openxmlformats.org/officeDocument/2006/relationships" xmlns:p="http://schemas.openxmlformats.org/presentationml/2006/main">
+  <p:cSld>
+    <p:spTree>
+      <p:nvGrpSpPr>
+        <p:cNvPr id="1" name=""/>
+        <p:cNvGrpSpPr/>
+        <p:nvPr/>
+      </p:nvGrpSpPr>
+      <p:grpSpPr>
+        <a:xfrm>
+          <a:off x="0" y="0"/>
+          <a:ext cx="0" cy="0"/>
+          <a:chOff x="0" y="0"/>
+          <a:chExt cx="0" cy="0"/>
+        </a:xfrm>
+      </p:grpSpPr>
+      <p:sp>
+        <p:nvSpPr>
+          <p:cNvPr id="2" name="Title 1">
+            <a:extLst>
+              <a:ext uri="{FF2B5EF4-FFF2-40B4-BE49-F238E27FC236}">
+                <a16:creationId xmlns:a16="http://schemas.microsoft.com/office/drawing/2014/main" id="{C80E2EB9-8909-461A-A6CD-0FDF471D8DB0}"/>
+              </a:ext>
+            </a:extLst>
+          </p:cNvPr>
+          <p:cNvSpPr>
+            <a:spLocks noGrp="1"/>
+          </p:cNvSpPr>
+          <p:nvPr>
+            <p:ph type="title"/>
+          </p:nvPr>
+        </p:nvSpPr>
+        <p:spPr/>
+        <p:txBody>
+          <a:bodyPr/>
+          <a:lstStyle/>
+          <a:p>
+            <a:r>
+              <a:rPr lang="en-US" dirty="0"/>
+              <a:t>How to copy across sheets</a:t>
+            </a:r>
+          </a:p>
+        </p:txBody>
+      </p:sp>
+      <p:pic>
+        <p:nvPicPr>
+          <p:cNvPr id="5" name="Content Placeholder 4">
+            <a:extLst>
+              <a:ext uri="{FF2B5EF4-FFF2-40B4-BE49-F238E27FC236}">
+                <a16:creationId xmlns:a16="http://schemas.microsoft.com/office/drawing/2014/main" id="{1F440E67-BAAD-4A2A-A98C-1A014CD14717}"/>
+              </a:ext>
+            </a:extLst>
+          </p:cNvPr>
+          <p:cNvPicPr>
+            <a:picLocks noGrp="1" noChangeAspect="1"/>
+          </p:cNvPicPr>
+          <p:nvPr>
+            <p:ph idx="1"/>
+          </p:nvPr>
+        </p:nvPicPr>
+        <p:blipFill>
+          <a:blip r:embed="rId2"/>
+          <a:stretch>
+            <a:fillRect/>
+          </a:stretch>
+        </p:blipFill>
+        <p:spPr>
+          <a:xfrm>
+            <a:off x="432842" y="2064285"/>
+            <a:ext cx="4491698" cy="3994897"/>
+          </a:xfrm>
+        </p:spPr>
+      </p:pic>
+      <p:pic>
+        <p:nvPicPr>
+          <p:cNvPr id="9" name="Picture 8">
+            <a:extLst>
+              <a:ext uri="{FF2B5EF4-FFF2-40B4-BE49-F238E27FC236}">
+                <a16:creationId xmlns:a16="http://schemas.microsoft.com/office/drawing/2014/main" id="{4D379E23-FA2F-44A2-83DC-00925B9C9140}"/>
+              </a:ext>
+            </a:extLst>
+          </p:cNvPr>
+          <p:cNvPicPr>
+            <a:picLocks noChangeAspect="1"/>
+          </p:cNvPicPr>
+          <p:nvPr/>
+        </p:nvPicPr>
+        <p:blipFill>
+          <a:blip r:embed="rId3"/>
+          <a:stretch>
+            <a:fillRect/>
+          </a:stretch>
+        </p:blipFill>
+        <p:spPr>
+          <a:xfrm>
+            <a:off x="6305822" y="2064285"/>
+            <a:ext cx="6080158" cy="4068609"/>
+          </a:xfrm>
+          <a:prstGeom prst="rect">
+            <a:avLst/>
+          </a:prstGeom>
+        </p:spPr>
+      </p:pic>
+      <p:sp>
+        <p:nvSpPr>
+          <p:cNvPr id="10" name="TextBox 9">
+            <a:extLst>
+              <a:ext uri="{FF2B5EF4-FFF2-40B4-BE49-F238E27FC236}">
+                <a16:creationId xmlns:a16="http://schemas.microsoft.com/office/drawing/2014/main" id="{BC9754B3-5198-4DA7-9E04-7C601842F0B8}"/>
+              </a:ext>
+            </a:extLst>
+          </p:cNvPr>
+          <p:cNvSpPr txBox="1"/>
+          <p:nvPr/>
+        </p:nvSpPr>
+        <p:spPr>
+          <a:xfrm>
+            <a:off x="209320" y="1690688"/>
+            <a:ext cx="771181" cy="369332"/>
+          </a:xfrm>
+          <a:prstGeom prst="rect">
+            <a:avLst/>
+          </a:prstGeom>
+          <a:noFill/>
+        </p:spPr>
+        <p:txBody>
+          <a:bodyPr wrap="square" rtlCol="0">
+            <a:spAutoFit/>
+          </a:bodyPr>
+          <a:lstStyle/>
+          <a:p>
+            <a:r>
+              <a:rPr lang="en-US" dirty="0"/>
+              <a:t>Step 1</a:t>
+            </a:r>
+          </a:p>
+        </p:txBody>
+      </p:sp>
+      <p:sp>
+        <p:nvSpPr>
+          <p:cNvPr id="11" name="TextBox 10">
+            <a:extLst>
+              <a:ext uri="{FF2B5EF4-FFF2-40B4-BE49-F238E27FC236}">
+                <a16:creationId xmlns:a16="http://schemas.microsoft.com/office/drawing/2014/main" id="{A62D848C-B426-42C5-A295-E42180C253BB}"/>
+              </a:ext>
+            </a:extLst>
+          </p:cNvPr>
+          <p:cNvSpPr txBox="1"/>
+          <p:nvPr/>
+        </p:nvSpPr>
+        <p:spPr>
+          <a:xfrm>
+            <a:off x="5395969" y="1824325"/>
+            <a:ext cx="771181" cy="369332"/>
+          </a:xfrm>
+          <a:prstGeom prst="rect">
+            <a:avLst/>
+          </a:prstGeom>
+          <a:noFill/>
+        </p:spPr>
+        <p:txBody>
+          <a:bodyPr wrap="square" rtlCol="0">
+            <a:spAutoFit/>
+          </a:bodyPr>
+          <a:lstStyle/>
+          <a:p>
+            <a:r>
+              <a:rPr lang="en-US" dirty="0"/>
+              <a:t>Step 2</a:t>
+            </a:r>
+          </a:p>
+        </p:txBody>
+      </p:sp>
+    </p:spTree>
+    <p:extLst>
+      <p:ext uri="{BB962C8B-B14F-4D97-AF65-F5344CB8AC3E}">
+        <p14:creationId xmlns:p14="http://schemas.microsoft.com/office/powerpoint/2010/main" val="324627036"/>
+      </p:ext>
+    </p:extLst>
+  </p:cSld>
+  <p:clrMapOvr>
+    <a:masterClrMapping/>
+  </p:clrMapOvr>
+</p:sld>
+</file>
+
+<file path=ppt/slides/slide9.xml><?xml version="1.0" encoding="utf-8"?>
+<p:sld xmlns:a="http://schemas.openxmlformats.org/drawingml/2006/main" xmlns:r="http://schemas.openxmlformats.org/officeDocument/2006/relationships" xmlns:p="http://schemas.openxmlformats.org/presentationml/2006/main">
+  <p:cSld>
+    <p:spTree>
+      <p:nvGrpSpPr>
+        <p:cNvPr id="1" name=""/>
+        <p:cNvGrpSpPr/>
+        <p:nvPr/>
+      </p:nvGrpSpPr>
+      <p:grpSpPr>
+        <a:xfrm>
+          <a:off x="0" y="0"/>
+          <a:ext cx="0" cy="0"/>
+          <a:chOff x="0" y="0"/>
+          <a:chExt cx="0" cy="0"/>
+        </a:xfrm>
+      </p:grpSpPr>
+      <p:sp>
+        <p:nvSpPr>
+          <p:cNvPr id="2" name="Title 1">
+            <a:extLst>
+              <a:ext uri="{FF2B5EF4-FFF2-40B4-BE49-F238E27FC236}">
+                <a16:creationId xmlns:a16="http://schemas.microsoft.com/office/drawing/2014/main" id="{DAA158D0-0615-42B9-8ADC-F2D958E0B38E}"/>
+              </a:ext>
+            </a:extLst>
+          </p:cNvPr>
+          <p:cNvSpPr>
+            <a:spLocks noGrp="1"/>
+          </p:cNvSpPr>
+          <p:nvPr>
+            <p:ph type="title"/>
+          </p:nvPr>
+        </p:nvSpPr>
+        <p:spPr/>
+        <p:txBody>
+          <a:bodyPr/>
+          <a:lstStyle/>
+          <a:p>
+            <a:endParaRPr lang="en-US"/>
+          </a:p>
+        </p:txBody>
+      </p:sp>
+      <p:sp>
+        <p:nvSpPr>
+          <p:cNvPr id="3" name="Content Placeholder 2">
+            <a:extLst>
+              <a:ext uri="{FF2B5EF4-FFF2-40B4-BE49-F238E27FC236}">
+                <a16:creationId xmlns:a16="http://schemas.microsoft.com/office/drawing/2014/main" id="{AEC177F8-D957-45D5-BA68-2C344B6DC109}"/>
+              </a:ext>
+            </a:extLst>
+          </p:cNvPr>
+          <p:cNvSpPr>
+            <a:spLocks noGrp="1"/>
+          </p:cNvSpPr>
+          <p:nvPr>
+            <p:ph idx="1"/>
+          </p:nvPr>
+        </p:nvSpPr>
+        <p:spPr/>
+        <p:txBody>
+          <a:bodyPr/>
+          <a:lstStyle/>
+          <a:p>
+            <a:endParaRPr lang="en-US"/>
+          </a:p>
+        </p:txBody>
+      </p:sp>
+    </p:spTree>
+    <p:extLst>
+      <p:ext uri="{BB962C8B-B14F-4D97-AF65-F5344CB8AC3E}">
+        <p14:creationId xmlns:p14="http://schemas.microsoft.com/office/powerpoint/2010/main" val="3360279009"/>
+      </p:ext>
+    </p:extLst>
+  </p:cSld>
+  <p:clrMapOvr>
+    <a:masterClrMapping/>
+  </p:clrMapOvr>
+</p:sld>
+</file>
+
 <file path=ppt/theme/theme1.xml><?xml version="1.0" encoding="utf-8"?>
 <a:theme xmlns:a="http://schemas.openxmlformats.org/drawingml/2006/main" name="Office Theme">
   <a:themeElements>

</xml_diff>

<commit_message>
commit latest changes to github
</commit_message>
<xml_diff>
--- a/ExcelEssentialSkills.pptx
+++ b/ExcelEssentialSkills.pptx
@@ -6,14 +6,15 @@
   </p:sldMasterIdLst>
   <p:sldIdLst>
     <p:sldId id="256" r:id="rId2"/>
-    <p:sldId id="257" r:id="rId3"/>
-    <p:sldId id="258" r:id="rId4"/>
-    <p:sldId id="259" r:id="rId5"/>
-    <p:sldId id="260" r:id="rId6"/>
-    <p:sldId id="261" r:id="rId7"/>
-    <p:sldId id="262" r:id="rId8"/>
-    <p:sldId id="263" r:id="rId9"/>
-    <p:sldId id="264" r:id="rId10"/>
+    <p:sldId id="265" r:id="rId3"/>
+    <p:sldId id="257" r:id="rId4"/>
+    <p:sldId id="258" r:id="rId5"/>
+    <p:sldId id="259" r:id="rId6"/>
+    <p:sldId id="260" r:id="rId7"/>
+    <p:sldId id="261" r:id="rId8"/>
+    <p:sldId id="262" r:id="rId9"/>
+    <p:sldId id="263" r:id="rId10"/>
+    <p:sldId id="264" r:id="rId11"/>
   </p:sldIdLst>
   <p:sldSz cx="12192000" cy="6858000"/>
   <p:notesSz cx="6858000" cy="9144000"/>
@@ -112,6 +113,11 @@
       </a:defRPr>
     </a:lvl9pPr>
   </p:defaultTextStyle>
+  <p:extLst>
+    <p:ext uri="{EFAFB233-063F-42B5-8137-9DF3F51BA10A}">
+      <p15:sldGuideLst xmlns:p15="http://schemas.microsoft.com/office/powerpoint/2012/main"/>
+    </p:ext>
+  </p:extLst>
 </p:presentation>
 </file>
 
@@ -262,7 +268,7 @@
           <a:p>
             <a:fld id="{09C4AEFE-B11D-49B4-8BEA-502C998A1E51}" type="datetimeFigureOut">
               <a:rPr lang="en-US" smtClean="0"/>
-              <a:t>12/18/2021</a:t>
+              <a:t>12/24/2021</a:t>
             </a:fld>
             <a:endParaRPr lang="en-US"/>
           </a:p>
@@ -460,7 +466,7 @@
           <a:p>
             <a:fld id="{09C4AEFE-B11D-49B4-8BEA-502C998A1E51}" type="datetimeFigureOut">
               <a:rPr lang="en-US" smtClean="0"/>
-              <a:t>12/18/2021</a:t>
+              <a:t>12/24/2021</a:t>
             </a:fld>
             <a:endParaRPr lang="en-US"/>
           </a:p>
@@ -668,7 +674,7 @@
           <a:p>
             <a:fld id="{09C4AEFE-B11D-49B4-8BEA-502C998A1E51}" type="datetimeFigureOut">
               <a:rPr lang="en-US" smtClean="0"/>
-              <a:t>12/18/2021</a:t>
+              <a:t>12/24/2021</a:t>
             </a:fld>
             <a:endParaRPr lang="en-US"/>
           </a:p>
@@ -866,7 +872,7 @@
           <a:p>
             <a:fld id="{09C4AEFE-B11D-49B4-8BEA-502C998A1E51}" type="datetimeFigureOut">
               <a:rPr lang="en-US" smtClean="0"/>
-              <a:t>12/18/2021</a:t>
+              <a:t>12/24/2021</a:t>
             </a:fld>
             <a:endParaRPr lang="en-US"/>
           </a:p>
@@ -1141,7 +1147,7 @@
           <a:p>
             <a:fld id="{09C4AEFE-B11D-49B4-8BEA-502C998A1E51}" type="datetimeFigureOut">
               <a:rPr lang="en-US" smtClean="0"/>
-              <a:t>12/18/2021</a:t>
+              <a:t>12/24/2021</a:t>
             </a:fld>
             <a:endParaRPr lang="en-US"/>
           </a:p>
@@ -1406,7 +1412,7 @@
           <a:p>
             <a:fld id="{09C4AEFE-B11D-49B4-8BEA-502C998A1E51}" type="datetimeFigureOut">
               <a:rPr lang="en-US" smtClean="0"/>
-              <a:t>12/18/2021</a:t>
+              <a:t>12/24/2021</a:t>
             </a:fld>
             <a:endParaRPr lang="en-US"/>
           </a:p>
@@ -1818,7 +1824,7 @@
           <a:p>
             <a:fld id="{09C4AEFE-B11D-49B4-8BEA-502C998A1E51}" type="datetimeFigureOut">
               <a:rPr lang="en-US" smtClean="0"/>
-              <a:t>12/18/2021</a:t>
+              <a:t>12/24/2021</a:t>
             </a:fld>
             <a:endParaRPr lang="en-US"/>
           </a:p>
@@ -1959,7 +1965,7 @@
           <a:p>
             <a:fld id="{09C4AEFE-B11D-49B4-8BEA-502C998A1E51}" type="datetimeFigureOut">
               <a:rPr lang="en-US" smtClean="0"/>
-              <a:t>12/18/2021</a:t>
+              <a:t>12/24/2021</a:t>
             </a:fld>
             <a:endParaRPr lang="en-US"/>
           </a:p>
@@ -2072,7 +2078,7 @@
           <a:p>
             <a:fld id="{09C4AEFE-B11D-49B4-8BEA-502C998A1E51}" type="datetimeFigureOut">
               <a:rPr lang="en-US" smtClean="0"/>
-              <a:t>12/18/2021</a:t>
+              <a:t>12/24/2021</a:t>
             </a:fld>
             <a:endParaRPr lang="en-US"/>
           </a:p>
@@ -2383,7 +2389,7 @@
           <a:p>
             <a:fld id="{09C4AEFE-B11D-49B4-8BEA-502C998A1E51}" type="datetimeFigureOut">
               <a:rPr lang="en-US" smtClean="0"/>
-              <a:t>12/18/2021</a:t>
+              <a:t>12/24/2021</a:t>
             </a:fld>
             <a:endParaRPr lang="en-US"/>
           </a:p>
@@ -2671,7 +2677,7 @@
           <a:p>
             <a:fld id="{09C4AEFE-B11D-49B4-8BEA-502C998A1E51}" type="datetimeFigureOut">
               <a:rPr lang="en-US" smtClean="0"/>
-              <a:t>12/18/2021</a:t>
+              <a:t>12/24/2021</a:t>
             </a:fld>
             <a:endParaRPr lang="en-US"/>
           </a:p>
@@ -2912,7 +2918,7 @@
           <a:p>
             <a:fld id="{09C4AEFE-B11D-49B4-8BEA-502C998A1E51}" type="datetimeFigureOut">
               <a:rPr lang="en-US" smtClean="0"/>
-              <a:t>12/18/2021</a:t>
+              <a:t>12/24/2021</a:t>
             </a:fld>
             <a:endParaRPr lang="en-US"/>
           </a:p>
@@ -3005,54 +3011,6 @@
               <a:t>‹#›</a:t>
             </a:fld>
             <a:endParaRPr lang="en-US"/>
-          </a:p>
-        </p:txBody>
-      </p:sp>
-      <p:sp>
-        <p:nvSpPr>
-          <p:cNvPr id="7" name="MSIPCMContentMarking" descr="{&quot;HashCode&quot;:-1538819703,&quot;Placement&quot;:&quot;Header&quot;,&quot;Top&quot;:0.0,&quot;Left&quot;:0.0,&quot;SlideWidth&quot;:960,&quot;SlideHeight&quot;:540}">
-            <a:extLst>
-              <a:ext uri="{FF2B5EF4-FFF2-40B4-BE49-F238E27FC236}">
-                <a16:creationId xmlns:a16="http://schemas.microsoft.com/office/drawing/2014/main" id="{0CEE14E3-4EA9-464F-AD23-4334639D21C0}"/>
-              </a:ext>
-            </a:extLst>
-          </p:cNvPr>
-          <p:cNvSpPr txBox="1"/>
-          <p:nvPr userDrawn="1"/>
-        </p:nvSpPr>
-        <p:spPr>
-          <a:xfrm>
-            <a:off x="0" y="0"/>
-            <a:ext cx="1634581" cy="249198"/>
-          </a:xfrm>
-          <a:prstGeom prst="rect">
-            <a:avLst/>
-          </a:prstGeom>
-          <a:noFill/>
-        </p:spPr>
-        <p:txBody>
-          <a:bodyPr vert="horz" wrap="square" lIns="0" tIns="0" rIns="0" bIns="0" rtlCol="0" anchor="ctr" anchorCtr="1">
-            <a:spAutoFit/>
-          </a:bodyPr>
-          <a:lstStyle/>
-          <a:p>
-            <a:pPr algn="l">
-              <a:spcBef>
-                <a:spcPts val="0"/>
-              </a:spcBef>
-              <a:spcAft>
-                <a:spcPts val="0"/>
-              </a:spcAft>
-            </a:pPr>
-            <a:r>
-              <a:rPr lang="en-US" sz="1000">
-                <a:solidFill>
-                  <a:srgbClr val="0000FF"/>
-                </a:solidFill>
-                <a:latin typeface="Arial" panose="020B0604020202020204" pitchFamily="34" charset="0"/>
-              </a:rPr>
-              <a:t>[AMD Official Use Only]</a:t>
-            </a:r>
           </a:p>
         </p:txBody>
       </p:sp>
@@ -3443,7 +3401,228 @@
 </p:sld>
 </file>
 
+<file path=ppt/slides/slide10.xml><?xml version="1.0" encoding="utf-8"?>
+<p:sld xmlns:a="http://schemas.openxmlformats.org/drawingml/2006/main" xmlns:r="http://schemas.openxmlformats.org/officeDocument/2006/relationships" xmlns:p="http://schemas.openxmlformats.org/presentationml/2006/main">
+  <p:cSld>
+    <p:spTree>
+      <p:nvGrpSpPr>
+        <p:cNvPr id="1" name=""/>
+        <p:cNvGrpSpPr/>
+        <p:nvPr/>
+      </p:nvGrpSpPr>
+      <p:grpSpPr>
+        <a:xfrm>
+          <a:off x="0" y="0"/>
+          <a:ext cx="0" cy="0"/>
+          <a:chOff x="0" y="0"/>
+          <a:chExt cx="0" cy="0"/>
+        </a:xfrm>
+      </p:grpSpPr>
+      <p:sp>
+        <p:nvSpPr>
+          <p:cNvPr id="2" name="Title 1">
+            <a:extLst>
+              <a:ext uri="{FF2B5EF4-FFF2-40B4-BE49-F238E27FC236}">
+                <a16:creationId xmlns:a16="http://schemas.microsoft.com/office/drawing/2014/main" id="{DAA158D0-0615-42B9-8ADC-F2D958E0B38E}"/>
+              </a:ext>
+            </a:extLst>
+          </p:cNvPr>
+          <p:cNvSpPr>
+            <a:spLocks noGrp="1"/>
+          </p:cNvSpPr>
+          <p:nvPr>
+            <p:ph type="title"/>
+          </p:nvPr>
+        </p:nvSpPr>
+        <p:spPr/>
+        <p:txBody>
+          <a:bodyPr/>
+          <a:lstStyle/>
+          <a:p>
+            <a:endParaRPr lang="en-US"/>
+          </a:p>
+        </p:txBody>
+      </p:sp>
+      <p:sp>
+        <p:nvSpPr>
+          <p:cNvPr id="3" name="Content Placeholder 2">
+            <a:extLst>
+              <a:ext uri="{FF2B5EF4-FFF2-40B4-BE49-F238E27FC236}">
+                <a16:creationId xmlns:a16="http://schemas.microsoft.com/office/drawing/2014/main" id="{AEC177F8-D957-45D5-BA68-2C344B6DC109}"/>
+              </a:ext>
+            </a:extLst>
+          </p:cNvPr>
+          <p:cNvSpPr>
+            <a:spLocks noGrp="1"/>
+          </p:cNvSpPr>
+          <p:nvPr>
+            <p:ph idx="1"/>
+          </p:nvPr>
+        </p:nvSpPr>
+        <p:spPr/>
+        <p:txBody>
+          <a:bodyPr/>
+          <a:lstStyle/>
+          <a:p>
+            <a:endParaRPr lang="en-US"/>
+          </a:p>
+        </p:txBody>
+      </p:sp>
+    </p:spTree>
+    <p:extLst>
+      <p:ext uri="{BB962C8B-B14F-4D97-AF65-F5344CB8AC3E}">
+        <p14:creationId xmlns:p14="http://schemas.microsoft.com/office/powerpoint/2010/main" val="3360279009"/>
+      </p:ext>
+    </p:extLst>
+  </p:cSld>
+  <p:clrMapOvr>
+    <a:masterClrMapping/>
+  </p:clrMapOvr>
+</p:sld>
+</file>
+
 <file path=ppt/slides/slide2.xml><?xml version="1.0" encoding="utf-8"?>
+<p:sld xmlns:a="http://schemas.openxmlformats.org/drawingml/2006/main" xmlns:r="http://schemas.openxmlformats.org/officeDocument/2006/relationships" xmlns:p="http://schemas.openxmlformats.org/presentationml/2006/main">
+  <p:cSld>
+    <p:spTree>
+      <p:nvGrpSpPr>
+        <p:cNvPr id="1" name=""/>
+        <p:cNvGrpSpPr/>
+        <p:nvPr/>
+      </p:nvGrpSpPr>
+      <p:grpSpPr>
+        <a:xfrm>
+          <a:off x="0" y="0"/>
+          <a:ext cx="0" cy="0"/>
+          <a:chOff x="0" y="0"/>
+          <a:chExt cx="0" cy="0"/>
+        </a:xfrm>
+      </p:grpSpPr>
+      <p:sp>
+        <p:nvSpPr>
+          <p:cNvPr id="2" name="Title 1">
+            <a:extLst>
+              <a:ext uri="{FF2B5EF4-FFF2-40B4-BE49-F238E27FC236}">
+                <a16:creationId xmlns:a16="http://schemas.microsoft.com/office/drawing/2014/main" id="{D5497737-98D4-40DA-A07B-DB219E0FAEF3}"/>
+              </a:ext>
+            </a:extLst>
+          </p:cNvPr>
+          <p:cNvSpPr>
+            <a:spLocks noGrp="1"/>
+          </p:cNvSpPr>
+          <p:nvPr>
+            <p:ph type="title"/>
+          </p:nvPr>
+        </p:nvSpPr>
+        <p:spPr/>
+        <p:txBody>
+          <a:bodyPr/>
+          <a:lstStyle/>
+          <a:p>
+            <a:r>
+              <a:rPr lang="en-US" dirty="0"/>
+              <a:t>Workbook and worksheet</a:t>
+            </a:r>
+          </a:p>
+        </p:txBody>
+      </p:sp>
+      <p:sp>
+        <p:nvSpPr>
+          <p:cNvPr id="3" name="Content Placeholder 2">
+            <a:extLst>
+              <a:ext uri="{FF2B5EF4-FFF2-40B4-BE49-F238E27FC236}">
+                <a16:creationId xmlns:a16="http://schemas.microsoft.com/office/drawing/2014/main" id="{2E0C7898-0D8B-411C-9774-FC55D49FD023}"/>
+              </a:ext>
+            </a:extLst>
+          </p:cNvPr>
+          <p:cNvSpPr>
+            <a:spLocks noGrp="1"/>
+          </p:cNvSpPr>
+          <p:nvPr>
+            <p:ph idx="1"/>
+          </p:nvPr>
+        </p:nvSpPr>
+        <p:spPr/>
+        <p:txBody>
+          <a:bodyPr/>
+          <a:lstStyle/>
+          <a:p>
+            <a:r>
+              <a:rPr lang="en-US" b="0" i="0" dirty="0">
+                <a:solidFill>
+                  <a:srgbClr val="454545"/>
+                </a:solidFill>
+                <a:effectLst/>
+                <a:latin typeface="Calibri Light" panose="020F0302020204030204" pitchFamily="34" charset="0"/>
+                <a:cs typeface="Calibri Light" panose="020F0302020204030204" pitchFamily="34" charset="0"/>
+              </a:rPr>
+              <a:t>When you open Microsoft Excel (a spreadsheet program), you're </a:t>
+            </a:r>
+            <a:r>
+              <a:rPr lang="en-US" b="0" i="0" dirty="0">
+                <a:solidFill>
+                  <a:srgbClr val="FF0000"/>
+                </a:solidFill>
+                <a:effectLst/>
+                <a:latin typeface="Calibri Light" panose="020F0302020204030204" pitchFamily="34" charset="0"/>
+                <a:cs typeface="Calibri Light" panose="020F0302020204030204" pitchFamily="34" charset="0"/>
+              </a:rPr>
+              <a:t>opening a workbook</a:t>
+            </a:r>
+            <a:r>
+              <a:rPr lang="en-US" b="0" i="0" dirty="0">
+                <a:solidFill>
+                  <a:srgbClr val="454545"/>
+                </a:solidFill>
+                <a:effectLst/>
+                <a:latin typeface="Calibri Light" panose="020F0302020204030204" pitchFamily="34" charset="0"/>
+                <a:cs typeface="Calibri Light" panose="020F0302020204030204" pitchFamily="34" charset="0"/>
+              </a:rPr>
+              <a:t>. A workbook can </a:t>
+            </a:r>
+            <a:r>
+              <a:rPr lang="en-US" b="0" i="0" dirty="0">
+                <a:solidFill>
+                  <a:srgbClr val="FF0000"/>
+                </a:solidFill>
+                <a:effectLst/>
+                <a:latin typeface="Calibri Light" panose="020F0302020204030204" pitchFamily="34" charset="0"/>
+                <a:cs typeface="Calibri Light" panose="020F0302020204030204" pitchFamily="34" charset="0"/>
+              </a:rPr>
+              <a:t>contain one or more different worksheets </a:t>
+            </a:r>
+            <a:r>
+              <a:rPr lang="en-US" b="0" i="0" dirty="0">
+                <a:solidFill>
+                  <a:srgbClr val="454545"/>
+                </a:solidFill>
+                <a:effectLst/>
+                <a:latin typeface="Calibri Light" panose="020F0302020204030204" pitchFamily="34" charset="0"/>
+                <a:cs typeface="Calibri Light" panose="020F0302020204030204" pitchFamily="34" charset="0"/>
+              </a:rPr>
+              <a:t>that can be accessed through the tabs at the bottom of the worksheet your currently viewing.</a:t>
+            </a:r>
+            <a:endParaRPr lang="en-US" dirty="0">
+              <a:latin typeface="Calibri Light" panose="020F0302020204030204" pitchFamily="34" charset="0"/>
+              <a:cs typeface="Calibri Light" panose="020F0302020204030204" pitchFamily="34" charset="0"/>
+            </a:endParaRPr>
+          </a:p>
+        </p:txBody>
+      </p:sp>
+    </p:spTree>
+    <p:extLst>
+      <p:ext uri="{BB962C8B-B14F-4D97-AF65-F5344CB8AC3E}">
+        <p14:creationId xmlns:p14="http://schemas.microsoft.com/office/powerpoint/2010/main" val="1343192856"/>
+      </p:ext>
+    </p:extLst>
+  </p:cSld>
+  <p:clrMapOvr>
+    <a:masterClrMapping/>
+  </p:clrMapOvr>
+</p:sld>
+</file>
+
+<file path=ppt/slides/slide3.xml><?xml version="1.0" encoding="utf-8"?>
 <p:sld xmlns:a="http://schemas.openxmlformats.org/drawingml/2006/main" xmlns:r="http://schemas.openxmlformats.org/officeDocument/2006/relationships" xmlns:p="http://schemas.openxmlformats.org/presentationml/2006/main">
   <p:cSld>
     <p:spTree>
@@ -3680,7 +3859,7 @@
 </p:sld>
 </file>
 
-<file path=ppt/slides/slide3.xml><?xml version="1.0" encoding="utf-8"?>
+<file path=ppt/slides/slide4.xml><?xml version="1.0" encoding="utf-8"?>
 <p:sld xmlns:a="http://schemas.openxmlformats.org/drawingml/2006/main" xmlns:r="http://schemas.openxmlformats.org/officeDocument/2006/relationships" xmlns:p="http://schemas.openxmlformats.org/presentationml/2006/main">
   <p:cSld>
     <p:spTree>
@@ -3791,7 +3970,7 @@
 </p:sld>
 </file>
 
-<file path=ppt/slides/slide4.xml><?xml version="1.0" encoding="utf-8"?>
+<file path=ppt/slides/slide5.xml><?xml version="1.0" encoding="utf-8"?>
 <p:sld xmlns:a="http://schemas.openxmlformats.org/drawingml/2006/main" xmlns:r="http://schemas.openxmlformats.org/officeDocument/2006/relationships" xmlns:p="http://schemas.openxmlformats.org/presentationml/2006/main">
   <p:cSld>
     <p:spTree>
@@ -4044,7 +4223,7 @@
 </p:sld>
 </file>
 
-<file path=ppt/slides/slide5.xml><?xml version="1.0" encoding="utf-8"?>
+<file path=ppt/slides/slide6.xml><?xml version="1.0" encoding="utf-8"?>
 <p:sld xmlns:a="http://schemas.openxmlformats.org/drawingml/2006/main" xmlns:r="http://schemas.openxmlformats.org/officeDocument/2006/relationships" xmlns:p="http://schemas.openxmlformats.org/presentationml/2006/main">
   <p:cSld>
     <p:spTree>
@@ -4143,7 +4322,7 @@
 </p:sld>
 </file>
 
-<file path=ppt/slides/slide6.xml><?xml version="1.0" encoding="utf-8"?>
+<file path=ppt/slides/slide7.xml><?xml version="1.0" encoding="utf-8"?>
 <p:sld xmlns:a="http://schemas.openxmlformats.org/drawingml/2006/main" xmlns:r="http://schemas.openxmlformats.org/officeDocument/2006/relationships" xmlns:p="http://schemas.openxmlformats.org/presentationml/2006/main">
   <p:cSld>
     <p:spTree>
@@ -4301,125 +4480,6 @@
 </p:sld>
 </file>
 
-<file path=ppt/slides/slide7.xml><?xml version="1.0" encoding="utf-8"?>
-<p:sld xmlns:a="http://schemas.openxmlformats.org/drawingml/2006/main" xmlns:r="http://schemas.openxmlformats.org/officeDocument/2006/relationships" xmlns:p="http://schemas.openxmlformats.org/presentationml/2006/main">
-  <p:cSld>
-    <p:spTree>
-      <p:nvGrpSpPr>
-        <p:cNvPr id="1" name=""/>
-        <p:cNvGrpSpPr/>
-        <p:nvPr/>
-      </p:nvGrpSpPr>
-      <p:grpSpPr>
-        <a:xfrm>
-          <a:off x="0" y="0"/>
-          <a:ext cx="0" cy="0"/>
-          <a:chOff x="0" y="0"/>
-          <a:chExt cx="0" cy="0"/>
-        </a:xfrm>
-      </p:grpSpPr>
-      <p:sp>
-        <p:nvSpPr>
-          <p:cNvPr id="2" name="Title 1">
-            <a:extLst>
-              <a:ext uri="{FF2B5EF4-FFF2-40B4-BE49-F238E27FC236}">
-                <a16:creationId xmlns:a16="http://schemas.microsoft.com/office/drawing/2014/main" id="{D5F96D59-C5F9-4CDF-BBA8-1E2736FB7659}"/>
-              </a:ext>
-            </a:extLst>
-          </p:cNvPr>
-          <p:cNvSpPr>
-            <a:spLocks noGrp="1"/>
-          </p:cNvSpPr>
-          <p:nvPr>
-            <p:ph type="title"/>
-          </p:nvPr>
-        </p:nvSpPr>
-        <p:spPr/>
-        <p:txBody>
-          <a:bodyPr/>
-          <a:lstStyle/>
-          <a:p>
-            <a:r>
-              <a:rPr lang="en-US" dirty="0"/>
-              <a:t>How to copy across sheets</a:t>
-            </a:r>
-          </a:p>
-        </p:txBody>
-      </p:sp>
-      <p:sp>
-        <p:nvSpPr>
-          <p:cNvPr id="3" name="Content Placeholder 2">
-            <a:extLst>
-              <a:ext uri="{FF2B5EF4-FFF2-40B4-BE49-F238E27FC236}">
-                <a16:creationId xmlns:a16="http://schemas.microsoft.com/office/drawing/2014/main" id="{9D56F638-5B99-4F48-8DF7-96FE7819DC9D}"/>
-              </a:ext>
-            </a:extLst>
-          </p:cNvPr>
-          <p:cNvSpPr>
-            <a:spLocks noGrp="1"/>
-          </p:cNvSpPr>
-          <p:nvPr>
-            <p:ph idx="1"/>
-          </p:nvPr>
-        </p:nvSpPr>
-        <p:spPr/>
-        <p:txBody>
-          <a:bodyPr/>
-          <a:lstStyle/>
-          <a:p>
-            <a:r>
-              <a:rPr lang="en-US" dirty="0"/>
-              <a:t>E.g. Copy data from sheet 1 to sheet 2</a:t>
-            </a:r>
-          </a:p>
-          <a:p>
-            <a:endParaRPr lang="en-US" dirty="0"/>
-          </a:p>
-          <a:p>
-            <a:r>
-              <a:rPr lang="en-US" dirty="0"/>
-              <a:t>Put “=“ in sheet 2 cell and go to sheet 1 select particular cell which contains the </a:t>
-            </a:r>
-            <a:r>
-              <a:rPr lang="en-US" dirty="0" err="1"/>
-              <a:t>infor</a:t>
-            </a:r>
-            <a:r>
-              <a:rPr lang="en-US" dirty="0"/>
-              <a:t> we want to copy over</a:t>
-            </a:r>
-          </a:p>
-          <a:p>
-            <a:endParaRPr lang="en-US" dirty="0"/>
-          </a:p>
-          <a:p>
-            <a:r>
-              <a:rPr lang="en-US" dirty="0"/>
-              <a:t>Press “Enter” while still in  </a:t>
-            </a:r>
-            <a:r>
-              <a:rPr lang="en-US" sz="3200" b="1" dirty="0"/>
-              <a:t>Sheet1</a:t>
-            </a:r>
-          </a:p>
-          <a:p>
-            <a:endParaRPr lang="en-US" dirty="0"/>
-          </a:p>
-        </p:txBody>
-      </p:sp>
-    </p:spTree>
-    <p:extLst>
-      <p:ext uri="{BB962C8B-B14F-4D97-AF65-F5344CB8AC3E}">
-        <p14:creationId xmlns:p14="http://schemas.microsoft.com/office/powerpoint/2010/main" val="2904951680"/>
-      </p:ext>
-    </p:extLst>
-  </p:cSld>
-  <p:clrMapOvr>
-    <a:masterClrMapping/>
-  </p:clrMapOvr>
-</p:sld>
-</file>
-
 <file path=ppt/slides/slide8.xml><?xml version="1.0" encoding="utf-8"?>
 <p:sld xmlns:a="http://schemas.openxmlformats.org/drawingml/2006/main" xmlns:r="http://schemas.openxmlformats.org/officeDocument/2006/relationships" xmlns:p="http://schemas.openxmlformats.org/presentationml/2006/main">
   <p:cSld>
@@ -4442,7 +4502,7 @@
           <p:cNvPr id="2" name="Title 1">
             <a:extLst>
               <a:ext uri="{FF2B5EF4-FFF2-40B4-BE49-F238E27FC236}">
-                <a16:creationId xmlns:a16="http://schemas.microsoft.com/office/drawing/2014/main" id="{C80E2EB9-8909-461A-A6CD-0FDF471D8DB0}"/>
+                <a16:creationId xmlns:a16="http://schemas.microsoft.com/office/drawing/2014/main" id="{D5F96D59-C5F9-4CDF-BBA8-1E2736FB7659}"/>
               </a:ext>
             </a:extLst>
           </p:cNvPr>
@@ -4465,139 +4525,71 @@
           </a:p>
         </p:txBody>
       </p:sp>
-      <p:pic>
-        <p:nvPicPr>
-          <p:cNvPr id="5" name="Content Placeholder 4">
-            <a:extLst>
-              <a:ext uri="{FF2B5EF4-FFF2-40B4-BE49-F238E27FC236}">
-                <a16:creationId xmlns:a16="http://schemas.microsoft.com/office/drawing/2014/main" id="{1F440E67-BAAD-4A2A-A98C-1A014CD14717}"/>
-              </a:ext>
-            </a:extLst>
-          </p:cNvPr>
-          <p:cNvPicPr>
-            <a:picLocks noGrp="1" noChangeAspect="1"/>
-          </p:cNvPicPr>
+      <p:sp>
+        <p:nvSpPr>
+          <p:cNvPr id="3" name="Content Placeholder 2">
+            <a:extLst>
+              <a:ext uri="{FF2B5EF4-FFF2-40B4-BE49-F238E27FC236}">
+                <a16:creationId xmlns:a16="http://schemas.microsoft.com/office/drawing/2014/main" id="{9D56F638-5B99-4F48-8DF7-96FE7819DC9D}"/>
+              </a:ext>
+            </a:extLst>
+          </p:cNvPr>
+          <p:cNvSpPr>
+            <a:spLocks noGrp="1"/>
+          </p:cNvSpPr>
           <p:nvPr>
             <p:ph idx="1"/>
           </p:nvPr>
-        </p:nvPicPr>
-        <p:blipFill>
-          <a:blip r:embed="rId2"/>
-          <a:stretch>
-            <a:fillRect/>
-          </a:stretch>
-        </p:blipFill>
-        <p:spPr>
-          <a:xfrm>
-            <a:off x="432842" y="2064285"/>
-            <a:ext cx="4491698" cy="3994897"/>
-          </a:xfrm>
-        </p:spPr>
-      </p:pic>
-      <p:pic>
-        <p:nvPicPr>
-          <p:cNvPr id="9" name="Picture 8">
-            <a:extLst>
-              <a:ext uri="{FF2B5EF4-FFF2-40B4-BE49-F238E27FC236}">
-                <a16:creationId xmlns:a16="http://schemas.microsoft.com/office/drawing/2014/main" id="{4D379E23-FA2F-44A2-83DC-00925B9C9140}"/>
-              </a:ext>
-            </a:extLst>
-          </p:cNvPr>
-          <p:cNvPicPr>
-            <a:picLocks noChangeAspect="1"/>
-          </p:cNvPicPr>
-          <p:nvPr/>
-        </p:nvPicPr>
-        <p:blipFill>
-          <a:blip r:embed="rId3"/>
-          <a:stretch>
-            <a:fillRect/>
-          </a:stretch>
-        </p:blipFill>
-        <p:spPr>
-          <a:xfrm>
-            <a:off x="6305822" y="2064285"/>
-            <a:ext cx="6080158" cy="4068609"/>
-          </a:xfrm>
-          <a:prstGeom prst="rect">
-            <a:avLst/>
-          </a:prstGeom>
-        </p:spPr>
-      </p:pic>
-      <p:sp>
-        <p:nvSpPr>
-          <p:cNvPr id="10" name="TextBox 9">
-            <a:extLst>
-              <a:ext uri="{FF2B5EF4-FFF2-40B4-BE49-F238E27FC236}">
-                <a16:creationId xmlns:a16="http://schemas.microsoft.com/office/drawing/2014/main" id="{BC9754B3-5198-4DA7-9E04-7C601842F0B8}"/>
-              </a:ext>
-            </a:extLst>
-          </p:cNvPr>
-          <p:cNvSpPr txBox="1"/>
-          <p:nvPr/>
-        </p:nvSpPr>
-        <p:spPr>
-          <a:xfrm>
-            <a:off x="209320" y="1690688"/>
-            <a:ext cx="771181" cy="369332"/>
-          </a:xfrm>
-          <a:prstGeom prst="rect">
-            <a:avLst/>
-          </a:prstGeom>
-          <a:noFill/>
-        </p:spPr>
-        <p:txBody>
-          <a:bodyPr wrap="square" rtlCol="0">
-            <a:spAutoFit/>
-          </a:bodyPr>
+        </p:nvSpPr>
+        <p:spPr/>
+        <p:txBody>
+          <a:bodyPr/>
           <a:lstStyle/>
           <a:p>
             <a:r>
               <a:rPr lang="en-US" dirty="0"/>
-              <a:t>Step 1</a:t>
-            </a:r>
-          </a:p>
-        </p:txBody>
-      </p:sp>
-      <p:sp>
-        <p:nvSpPr>
-          <p:cNvPr id="11" name="TextBox 10">
-            <a:extLst>
-              <a:ext uri="{FF2B5EF4-FFF2-40B4-BE49-F238E27FC236}">
-                <a16:creationId xmlns:a16="http://schemas.microsoft.com/office/drawing/2014/main" id="{A62D848C-B426-42C5-A295-E42180C253BB}"/>
-              </a:ext>
-            </a:extLst>
-          </p:cNvPr>
-          <p:cNvSpPr txBox="1"/>
-          <p:nvPr/>
-        </p:nvSpPr>
-        <p:spPr>
-          <a:xfrm>
-            <a:off x="5395969" y="1824325"/>
-            <a:ext cx="771181" cy="369332"/>
-          </a:xfrm>
-          <a:prstGeom prst="rect">
-            <a:avLst/>
-          </a:prstGeom>
-          <a:noFill/>
-        </p:spPr>
-        <p:txBody>
-          <a:bodyPr wrap="square" rtlCol="0">
-            <a:spAutoFit/>
-          </a:bodyPr>
-          <a:lstStyle/>
+              <a:t>E.g. Copy data from sheet 1 to sheet 2</a:t>
+            </a:r>
+          </a:p>
+          <a:p>
+            <a:endParaRPr lang="en-US" dirty="0"/>
+          </a:p>
           <a:p>
             <a:r>
               <a:rPr lang="en-US" dirty="0"/>
-              <a:t>Step 2</a:t>
-            </a:r>
+              <a:t>Put “=“ in sheet 2 cell and go to sheet 1 select particular cell which contains the </a:t>
+            </a:r>
+            <a:r>
+              <a:rPr lang="en-US" dirty="0" err="1"/>
+              <a:t>infor</a:t>
+            </a:r>
+            <a:r>
+              <a:rPr lang="en-US" dirty="0"/>
+              <a:t> we want to copy over</a:t>
+            </a:r>
+          </a:p>
+          <a:p>
+            <a:endParaRPr lang="en-US" dirty="0"/>
+          </a:p>
+          <a:p>
+            <a:r>
+              <a:rPr lang="en-US" dirty="0"/>
+              <a:t>Press “Enter” while still in  </a:t>
+            </a:r>
+            <a:r>
+              <a:rPr lang="en-US" sz="3200" b="1" dirty="0"/>
+              <a:t>Sheet1</a:t>
+            </a:r>
+          </a:p>
+          <a:p>
+            <a:endParaRPr lang="en-US" dirty="0"/>
           </a:p>
         </p:txBody>
       </p:sp>
     </p:spTree>
     <p:extLst>
       <p:ext uri="{BB962C8B-B14F-4D97-AF65-F5344CB8AC3E}">
-        <p14:creationId xmlns:p14="http://schemas.microsoft.com/office/powerpoint/2010/main" val="324627036"/>
+        <p14:creationId xmlns:p14="http://schemas.microsoft.com/office/powerpoint/2010/main" val="2904951680"/>
       </p:ext>
     </p:extLst>
   </p:cSld>
@@ -4629,7 +4621,7 @@
           <p:cNvPr id="2" name="Title 1">
             <a:extLst>
               <a:ext uri="{FF2B5EF4-FFF2-40B4-BE49-F238E27FC236}">
-                <a16:creationId xmlns:a16="http://schemas.microsoft.com/office/drawing/2014/main" id="{DAA158D0-0615-42B9-8ADC-F2D958E0B38E}"/>
+                <a16:creationId xmlns:a16="http://schemas.microsoft.com/office/drawing/2014/main" id="{C80E2EB9-8909-461A-A6CD-0FDF471D8DB0}"/>
               </a:ext>
             </a:extLst>
           </p:cNvPr>
@@ -4645,39 +4637,146 @@
           <a:bodyPr/>
           <a:lstStyle/>
           <a:p>
-            <a:endParaRPr lang="en-US"/>
-          </a:p>
-        </p:txBody>
-      </p:sp>
-      <p:sp>
-        <p:nvSpPr>
-          <p:cNvPr id="3" name="Content Placeholder 2">
-            <a:extLst>
-              <a:ext uri="{FF2B5EF4-FFF2-40B4-BE49-F238E27FC236}">
-                <a16:creationId xmlns:a16="http://schemas.microsoft.com/office/drawing/2014/main" id="{AEC177F8-D957-45D5-BA68-2C344B6DC109}"/>
-              </a:ext>
-            </a:extLst>
-          </p:cNvPr>
-          <p:cNvSpPr>
-            <a:spLocks noGrp="1"/>
-          </p:cNvSpPr>
+            <a:r>
+              <a:rPr lang="en-US" dirty="0"/>
+              <a:t>How to copy across sheets</a:t>
+            </a:r>
+          </a:p>
+        </p:txBody>
+      </p:sp>
+      <p:pic>
+        <p:nvPicPr>
+          <p:cNvPr id="5" name="Content Placeholder 4">
+            <a:extLst>
+              <a:ext uri="{FF2B5EF4-FFF2-40B4-BE49-F238E27FC236}">
+                <a16:creationId xmlns:a16="http://schemas.microsoft.com/office/drawing/2014/main" id="{1F440E67-BAAD-4A2A-A98C-1A014CD14717}"/>
+              </a:ext>
+            </a:extLst>
+          </p:cNvPr>
+          <p:cNvPicPr>
+            <a:picLocks noGrp="1" noChangeAspect="1"/>
+          </p:cNvPicPr>
           <p:nvPr>
             <p:ph idx="1"/>
           </p:nvPr>
-        </p:nvSpPr>
-        <p:spPr/>
-        <p:txBody>
-          <a:bodyPr/>
-          <a:lstStyle/>
-          <a:p>
-            <a:endParaRPr lang="en-US"/>
+        </p:nvPicPr>
+        <p:blipFill>
+          <a:blip r:embed="rId2"/>
+          <a:stretch>
+            <a:fillRect/>
+          </a:stretch>
+        </p:blipFill>
+        <p:spPr>
+          <a:xfrm>
+            <a:off x="432842" y="2064285"/>
+            <a:ext cx="4491698" cy="3994897"/>
+          </a:xfrm>
+        </p:spPr>
+      </p:pic>
+      <p:pic>
+        <p:nvPicPr>
+          <p:cNvPr id="9" name="Picture 8">
+            <a:extLst>
+              <a:ext uri="{FF2B5EF4-FFF2-40B4-BE49-F238E27FC236}">
+                <a16:creationId xmlns:a16="http://schemas.microsoft.com/office/drawing/2014/main" id="{4D379E23-FA2F-44A2-83DC-00925B9C9140}"/>
+              </a:ext>
+            </a:extLst>
+          </p:cNvPr>
+          <p:cNvPicPr>
+            <a:picLocks noChangeAspect="1"/>
+          </p:cNvPicPr>
+          <p:nvPr/>
+        </p:nvPicPr>
+        <p:blipFill>
+          <a:blip r:embed="rId3"/>
+          <a:stretch>
+            <a:fillRect/>
+          </a:stretch>
+        </p:blipFill>
+        <p:spPr>
+          <a:xfrm>
+            <a:off x="6305822" y="2064285"/>
+            <a:ext cx="6080158" cy="4068609"/>
+          </a:xfrm>
+          <a:prstGeom prst="rect">
+            <a:avLst/>
+          </a:prstGeom>
+        </p:spPr>
+      </p:pic>
+      <p:sp>
+        <p:nvSpPr>
+          <p:cNvPr id="10" name="TextBox 9">
+            <a:extLst>
+              <a:ext uri="{FF2B5EF4-FFF2-40B4-BE49-F238E27FC236}">
+                <a16:creationId xmlns:a16="http://schemas.microsoft.com/office/drawing/2014/main" id="{BC9754B3-5198-4DA7-9E04-7C601842F0B8}"/>
+              </a:ext>
+            </a:extLst>
+          </p:cNvPr>
+          <p:cNvSpPr txBox="1"/>
+          <p:nvPr/>
+        </p:nvSpPr>
+        <p:spPr>
+          <a:xfrm>
+            <a:off x="209320" y="1690688"/>
+            <a:ext cx="771181" cy="369332"/>
+          </a:xfrm>
+          <a:prstGeom prst="rect">
+            <a:avLst/>
+          </a:prstGeom>
+          <a:noFill/>
+        </p:spPr>
+        <p:txBody>
+          <a:bodyPr wrap="square" rtlCol="0">
+            <a:spAutoFit/>
+          </a:bodyPr>
+          <a:lstStyle/>
+          <a:p>
+            <a:r>
+              <a:rPr lang="en-US" dirty="0"/>
+              <a:t>Step 1</a:t>
+            </a:r>
+          </a:p>
+        </p:txBody>
+      </p:sp>
+      <p:sp>
+        <p:nvSpPr>
+          <p:cNvPr id="11" name="TextBox 10">
+            <a:extLst>
+              <a:ext uri="{FF2B5EF4-FFF2-40B4-BE49-F238E27FC236}">
+                <a16:creationId xmlns:a16="http://schemas.microsoft.com/office/drawing/2014/main" id="{A62D848C-B426-42C5-A295-E42180C253BB}"/>
+              </a:ext>
+            </a:extLst>
+          </p:cNvPr>
+          <p:cNvSpPr txBox="1"/>
+          <p:nvPr/>
+        </p:nvSpPr>
+        <p:spPr>
+          <a:xfrm>
+            <a:off x="5395969" y="1824325"/>
+            <a:ext cx="771181" cy="369332"/>
+          </a:xfrm>
+          <a:prstGeom prst="rect">
+            <a:avLst/>
+          </a:prstGeom>
+          <a:noFill/>
+        </p:spPr>
+        <p:txBody>
+          <a:bodyPr wrap="square" rtlCol="0">
+            <a:spAutoFit/>
+          </a:bodyPr>
+          <a:lstStyle/>
+          <a:p>
+            <a:r>
+              <a:rPr lang="en-US" dirty="0"/>
+              <a:t>Step 2</a:t>
+            </a:r>
           </a:p>
         </p:txBody>
       </p:sp>
     </p:spTree>
     <p:extLst>
       <p:ext uri="{BB962C8B-B14F-4D97-AF65-F5344CB8AC3E}">
-        <p14:creationId xmlns:p14="http://schemas.microsoft.com/office/powerpoint/2010/main" val="3360279009"/>
+        <p14:creationId xmlns:p14="http://schemas.microsoft.com/office/powerpoint/2010/main" val="324627036"/>
       </p:ext>
     </p:extLst>
   </p:cSld>

</xml_diff>

<commit_message>
commit new changes on the excel seential
</commit_message>
<xml_diff>
--- a/ExcelEssentialSkills.pptx
+++ b/ExcelEssentialSkills.pptx
@@ -15,6 +15,8 @@
     <p:sldId id="262" r:id="rId9"/>
     <p:sldId id="263" r:id="rId10"/>
     <p:sldId id="264" r:id="rId11"/>
+    <p:sldId id="266" r:id="rId12"/>
+    <p:sldId id="267" r:id="rId13"/>
   </p:sldIdLst>
   <p:sldSz cx="12192000" cy="6858000"/>
   <p:notesSz cx="6858000" cy="9144000"/>
@@ -268,7 +270,7 @@
           <a:p>
             <a:fld id="{09C4AEFE-B11D-49B4-8BEA-502C998A1E51}" type="datetimeFigureOut">
               <a:rPr lang="en-US" smtClean="0"/>
-              <a:t>12/24/2021</a:t>
+              <a:t>1/5/2022</a:t>
             </a:fld>
             <a:endParaRPr lang="en-US"/>
           </a:p>
@@ -466,7 +468,7 @@
           <a:p>
             <a:fld id="{09C4AEFE-B11D-49B4-8BEA-502C998A1E51}" type="datetimeFigureOut">
               <a:rPr lang="en-US" smtClean="0"/>
-              <a:t>12/24/2021</a:t>
+              <a:t>1/5/2022</a:t>
             </a:fld>
             <a:endParaRPr lang="en-US"/>
           </a:p>
@@ -674,7 +676,7 @@
           <a:p>
             <a:fld id="{09C4AEFE-B11D-49B4-8BEA-502C998A1E51}" type="datetimeFigureOut">
               <a:rPr lang="en-US" smtClean="0"/>
-              <a:t>12/24/2021</a:t>
+              <a:t>1/5/2022</a:t>
             </a:fld>
             <a:endParaRPr lang="en-US"/>
           </a:p>
@@ -872,7 +874,7 @@
           <a:p>
             <a:fld id="{09C4AEFE-B11D-49B4-8BEA-502C998A1E51}" type="datetimeFigureOut">
               <a:rPr lang="en-US" smtClean="0"/>
-              <a:t>12/24/2021</a:t>
+              <a:t>1/5/2022</a:t>
             </a:fld>
             <a:endParaRPr lang="en-US"/>
           </a:p>
@@ -1147,7 +1149,7 @@
           <a:p>
             <a:fld id="{09C4AEFE-B11D-49B4-8BEA-502C998A1E51}" type="datetimeFigureOut">
               <a:rPr lang="en-US" smtClean="0"/>
-              <a:t>12/24/2021</a:t>
+              <a:t>1/5/2022</a:t>
             </a:fld>
             <a:endParaRPr lang="en-US"/>
           </a:p>
@@ -1412,7 +1414,7 @@
           <a:p>
             <a:fld id="{09C4AEFE-B11D-49B4-8BEA-502C998A1E51}" type="datetimeFigureOut">
               <a:rPr lang="en-US" smtClean="0"/>
-              <a:t>12/24/2021</a:t>
+              <a:t>1/5/2022</a:t>
             </a:fld>
             <a:endParaRPr lang="en-US"/>
           </a:p>
@@ -1824,7 +1826,7 @@
           <a:p>
             <a:fld id="{09C4AEFE-B11D-49B4-8BEA-502C998A1E51}" type="datetimeFigureOut">
               <a:rPr lang="en-US" smtClean="0"/>
-              <a:t>12/24/2021</a:t>
+              <a:t>1/5/2022</a:t>
             </a:fld>
             <a:endParaRPr lang="en-US"/>
           </a:p>
@@ -1965,7 +1967,7 @@
           <a:p>
             <a:fld id="{09C4AEFE-B11D-49B4-8BEA-502C998A1E51}" type="datetimeFigureOut">
               <a:rPr lang="en-US" smtClean="0"/>
-              <a:t>12/24/2021</a:t>
+              <a:t>1/5/2022</a:t>
             </a:fld>
             <a:endParaRPr lang="en-US"/>
           </a:p>
@@ -2078,7 +2080,7 @@
           <a:p>
             <a:fld id="{09C4AEFE-B11D-49B4-8BEA-502C998A1E51}" type="datetimeFigureOut">
               <a:rPr lang="en-US" smtClean="0"/>
-              <a:t>12/24/2021</a:t>
+              <a:t>1/5/2022</a:t>
             </a:fld>
             <a:endParaRPr lang="en-US"/>
           </a:p>
@@ -2389,7 +2391,7 @@
           <a:p>
             <a:fld id="{09C4AEFE-B11D-49B4-8BEA-502C998A1E51}" type="datetimeFigureOut">
               <a:rPr lang="en-US" smtClean="0"/>
-              <a:t>12/24/2021</a:t>
+              <a:t>1/5/2022</a:t>
             </a:fld>
             <a:endParaRPr lang="en-US"/>
           </a:p>
@@ -2677,7 +2679,7 @@
           <a:p>
             <a:fld id="{09C4AEFE-B11D-49B4-8BEA-502C998A1E51}" type="datetimeFigureOut">
               <a:rPr lang="en-US" smtClean="0"/>
-              <a:t>12/24/2021</a:t>
+              <a:t>1/5/2022</a:t>
             </a:fld>
             <a:endParaRPr lang="en-US"/>
           </a:p>
@@ -2918,7 +2920,7 @@
           <a:p>
             <a:fld id="{09C4AEFE-B11D-49B4-8BEA-502C998A1E51}" type="datetimeFigureOut">
               <a:rPr lang="en-US" smtClean="0"/>
-              <a:t>12/24/2021</a:t>
+              <a:t>1/5/2022</a:t>
             </a:fld>
             <a:endParaRPr lang="en-US"/>
           </a:p>
@@ -3439,32 +3441,113 @@
           <a:bodyPr/>
           <a:lstStyle/>
           <a:p>
-            <a:endParaRPr lang="en-US"/>
-          </a:p>
-        </p:txBody>
-      </p:sp>
-      <p:sp>
-        <p:nvSpPr>
-          <p:cNvPr id="3" name="Content Placeholder 2">
-            <a:extLst>
-              <a:ext uri="{FF2B5EF4-FFF2-40B4-BE49-F238E27FC236}">
-                <a16:creationId xmlns:a16="http://schemas.microsoft.com/office/drawing/2014/main" id="{AEC177F8-D957-45D5-BA68-2C344B6DC109}"/>
-              </a:ext>
-            </a:extLst>
-          </p:cNvPr>
-          <p:cNvSpPr>
-            <a:spLocks noGrp="1"/>
-          </p:cNvSpPr>
+            <a:r>
+              <a:rPr lang="en-US" dirty="0"/>
+              <a:t>To Change multiple worksheet simultaneously </a:t>
+            </a:r>
+          </a:p>
+        </p:txBody>
+      </p:sp>
+      <p:pic>
+        <p:nvPicPr>
+          <p:cNvPr id="5" name="Content Placeholder 4">
+            <a:extLst>
+              <a:ext uri="{FF2B5EF4-FFF2-40B4-BE49-F238E27FC236}">
+                <a16:creationId xmlns:a16="http://schemas.microsoft.com/office/drawing/2014/main" id="{6A1F855C-2220-4ECE-8A88-B2A834B1A742}"/>
+              </a:ext>
+            </a:extLst>
+          </p:cNvPr>
+          <p:cNvPicPr>
+            <a:picLocks noGrp="1" noChangeAspect="1"/>
+          </p:cNvPicPr>
           <p:nvPr>
             <p:ph idx="1"/>
           </p:nvPr>
-        </p:nvSpPr>
-        <p:spPr/>
-        <p:txBody>
-          <a:bodyPr/>
-          <a:lstStyle/>
-          <a:p>
-            <a:endParaRPr lang="en-US"/>
+        </p:nvPicPr>
+        <p:blipFill>
+          <a:blip r:embed="rId2"/>
+          <a:stretch>
+            <a:fillRect/>
+          </a:stretch>
+        </p:blipFill>
+        <p:spPr>
+          <a:xfrm>
+            <a:off x="1156476" y="1784529"/>
+            <a:ext cx="4515937" cy="4351338"/>
+          </a:xfrm>
+        </p:spPr>
+      </p:pic>
+      <p:cxnSp>
+        <p:nvCxnSpPr>
+          <p:cNvPr id="7" name="Straight Arrow Connector 6">
+            <a:extLst>
+              <a:ext uri="{FF2B5EF4-FFF2-40B4-BE49-F238E27FC236}">
+                <a16:creationId xmlns:a16="http://schemas.microsoft.com/office/drawing/2014/main" id="{9D91632D-5819-497F-A11D-2B780CC5C823}"/>
+              </a:ext>
+            </a:extLst>
+          </p:cNvPr>
+          <p:cNvCxnSpPr/>
+          <p:nvPr/>
+        </p:nvCxnSpPr>
+        <p:spPr>
+          <a:xfrm>
+            <a:off x="2989780" y="5804899"/>
+            <a:ext cx="3226085" cy="82193"/>
+          </a:xfrm>
+          <a:prstGeom prst="straightConnector1">
+            <a:avLst/>
+          </a:prstGeom>
+          <a:ln>
+            <a:tailEnd type="triangle"/>
+          </a:ln>
+        </p:spPr>
+        <p:style>
+          <a:lnRef idx="1">
+            <a:schemeClr val="accent1"/>
+          </a:lnRef>
+          <a:fillRef idx="0">
+            <a:schemeClr val="accent1"/>
+          </a:fillRef>
+          <a:effectRef idx="0">
+            <a:schemeClr val="accent1"/>
+          </a:effectRef>
+          <a:fontRef idx="minor">
+            <a:schemeClr val="tx1"/>
+          </a:fontRef>
+        </p:style>
+      </p:cxnSp>
+      <p:sp>
+        <p:nvSpPr>
+          <p:cNvPr id="8" name="TextBox 7">
+            <a:extLst>
+              <a:ext uri="{FF2B5EF4-FFF2-40B4-BE49-F238E27FC236}">
+                <a16:creationId xmlns:a16="http://schemas.microsoft.com/office/drawing/2014/main" id="{DAA9FB25-C98A-4E68-AC9D-1C591D07CCF1}"/>
+              </a:ext>
+            </a:extLst>
+          </p:cNvPr>
+          <p:cNvSpPr txBox="1"/>
+          <p:nvPr/>
+        </p:nvSpPr>
+        <p:spPr>
+          <a:xfrm>
+            <a:off x="6246688" y="5630238"/>
+            <a:ext cx="5945312" cy="923330"/>
+          </a:xfrm>
+          <a:prstGeom prst="rect">
+            <a:avLst/>
+          </a:prstGeom>
+          <a:noFill/>
+        </p:spPr>
+        <p:txBody>
+          <a:bodyPr wrap="square" rtlCol="0">
+            <a:spAutoFit/>
+          </a:bodyPr>
+          <a:lstStyle/>
+          <a:p>
+            <a:r>
+              <a:rPr lang="en-US" dirty="0"/>
+              <a:t>Select worksheet 1 by 1 (click while holding ctrl key). Make changes on any of the worksheet, the changes will be applied to the rest worksheets as well</a:t>
+            </a:r>
           </a:p>
         </p:txBody>
       </p:sp>
@@ -3472,6 +3555,423 @@
     <p:extLst>
       <p:ext uri="{BB962C8B-B14F-4D97-AF65-F5344CB8AC3E}">
         <p14:creationId xmlns:p14="http://schemas.microsoft.com/office/powerpoint/2010/main" val="3360279009"/>
+      </p:ext>
+    </p:extLst>
+  </p:cSld>
+  <p:clrMapOvr>
+    <a:masterClrMapping/>
+  </p:clrMapOvr>
+</p:sld>
+</file>
+
+<file path=ppt/slides/slide11.xml><?xml version="1.0" encoding="utf-8"?>
+<p:sld xmlns:a="http://schemas.openxmlformats.org/drawingml/2006/main" xmlns:r="http://schemas.openxmlformats.org/officeDocument/2006/relationships" xmlns:p="http://schemas.openxmlformats.org/presentationml/2006/main">
+  <p:cSld>
+    <p:spTree>
+      <p:nvGrpSpPr>
+        <p:cNvPr id="1" name=""/>
+        <p:cNvGrpSpPr/>
+        <p:nvPr/>
+      </p:nvGrpSpPr>
+      <p:grpSpPr>
+        <a:xfrm>
+          <a:off x="0" y="0"/>
+          <a:ext cx="0" cy="0"/>
+          <a:chOff x="0" y="0"/>
+          <a:chExt cx="0" cy="0"/>
+        </a:xfrm>
+      </p:grpSpPr>
+      <p:sp>
+        <p:nvSpPr>
+          <p:cNvPr id="2" name="Title 1">
+            <a:extLst>
+              <a:ext uri="{FF2B5EF4-FFF2-40B4-BE49-F238E27FC236}">
+                <a16:creationId xmlns:a16="http://schemas.microsoft.com/office/drawing/2014/main" id="{115C2DCB-0B58-4A0C-B80D-4661BBA2CB93}"/>
+              </a:ext>
+            </a:extLst>
+          </p:cNvPr>
+          <p:cNvSpPr>
+            <a:spLocks noGrp="1"/>
+          </p:cNvSpPr>
+          <p:nvPr>
+            <p:ph type="title"/>
+          </p:nvPr>
+        </p:nvSpPr>
+        <p:spPr>
+          <a:xfrm>
+            <a:off x="437508" y="-76664"/>
+            <a:ext cx="10515600" cy="929419"/>
+          </a:xfrm>
+        </p:spPr>
+        <p:txBody>
+          <a:bodyPr/>
+          <a:lstStyle/>
+          <a:p>
+            <a:r>
+              <a:rPr lang="en-US" dirty="0"/>
+              <a:t>How to add values from different worksheet</a:t>
+            </a:r>
+          </a:p>
+        </p:txBody>
+      </p:sp>
+      <p:sp>
+        <p:nvSpPr>
+          <p:cNvPr id="3" name="Content Placeholder 2">
+            <a:extLst>
+              <a:ext uri="{FF2B5EF4-FFF2-40B4-BE49-F238E27FC236}">
+                <a16:creationId xmlns:a16="http://schemas.microsoft.com/office/drawing/2014/main" id="{7EB10851-9A9B-4614-A229-12192139B0BF}"/>
+              </a:ext>
+            </a:extLst>
+          </p:cNvPr>
+          <p:cNvSpPr>
+            <a:spLocks noGrp="1"/>
+          </p:cNvSpPr>
+          <p:nvPr>
+            <p:ph idx="1"/>
+          </p:nvPr>
+        </p:nvSpPr>
+        <p:spPr>
+          <a:xfrm>
+            <a:off x="437508" y="852756"/>
+            <a:ext cx="10916292" cy="5324208"/>
+          </a:xfrm>
+        </p:spPr>
+        <p:txBody>
+          <a:bodyPr/>
+          <a:lstStyle/>
+          <a:p>
+            <a:r>
+              <a:rPr lang="en-US" dirty="0"/>
+              <a:t>3D formula</a:t>
+            </a:r>
+          </a:p>
+          <a:p>
+            <a:endParaRPr lang="en-US" dirty="0"/>
+          </a:p>
+        </p:txBody>
+      </p:sp>
+      <p:pic>
+        <p:nvPicPr>
+          <p:cNvPr id="5" name="Picture 4">
+            <a:extLst>
+              <a:ext uri="{FF2B5EF4-FFF2-40B4-BE49-F238E27FC236}">
+                <a16:creationId xmlns:a16="http://schemas.microsoft.com/office/drawing/2014/main" id="{564620DA-0D1F-4A7F-BFE1-28E7B7A825D2}"/>
+              </a:ext>
+            </a:extLst>
+          </p:cNvPr>
+          <p:cNvPicPr>
+            <a:picLocks noChangeAspect="1"/>
+          </p:cNvPicPr>
+          <p:nvPr/>
+        </p:nvPicPr>
+        <p:blipFill>
+          <a:blip r:embed="rId2"/>
+          <a:stretch>
+            <a:fillRect/>
+          </a:stretch>
+        </p:blipFill>
+        <p:spPr>
+          <a:xfrm>
+            <a:off x="774449" y="1478150"/>
+            <a:ext cx="5605479" cy="2710665"/>
+          </a:xfrm>
+          <a:prstGeom prst="rect">
+            <a:avLst/>
+          </a:prstGeom>
+        </p:spPr>
+      </p:pic>
+      <p:cxnSp>
+        <p:nvCxnSpPr>
+          <p:cNvPr id="7" name="Straight Arrow Connector 6">
+            <a:extLst>
+              <a:ext uri="{FF2B5EF4-FFF2-40B4-BE49-F238E27FC236}">
+                <a16:creationId xmlns:a16="http://schemas.microsoft.com/office/drawing/2014/main" id="{4A890510-0D41-4D91-9F9E-198A166BDE7E}"/>
+              </a:ext>
+            </a:extLst>
+          </p:cNvPr>
+          <p:cNvCxnSpPr>
+            <a:cxnSpLocks/>
+          </p:cNvCxnSpPr>
+          <p:nvPr/>
+        </p:nvCxnSpPr>
+        <p:spPr>
+          <a:xfrm>
+            <a:off x="5815173" y="2778687"/>
+            <a:ext cx="1983341" cy="1"/>
+          </a:xfrm>
+          <a:prstGeom prst="straightConnector1">
+            <a:avLst/>
+          </a:prstGeom>
+          <a:ln>
+            <a:tailEnd type="triangle"/>
+          </a:ln>
+        </p:spPr>
+        <p:style>
+          <a:lnRef idx="1">
+            <a:schemeClr val="accent1"/>
+          </a:lnRef>
+          <a:fillRef idx="0">
+            <a:schemeClr val="accent1"/>
+          </a:fillRef>
+          <a:effectRef idx="0">
+            <a:schemeClr val="accent1"/>
+          </a:effectRef>
+          <a:fontRef idx="minor">
+            <a:schemeClr val="tx1"/>
+          </a:fontRef>
+        </p:style>
+      </p:cxnSp>
+      <p:sp>
+        <p:nvSpPr>
+          <p:cNvPr id="8" name="TextBox 7">
+            <a:extLst>
+              <a:ext uri="{FF2B5EF4-FFF2-40B4-BE49-F238E27FC236}">
+                <a16:creationId xmlns:a16="http://schemas.microsoft.com/office/drawing/2014/main" id="{AB6A4DE1-8A20-4D34-9879-CDD7D2906CCB}"/>
+              </a:ext>
+            </a:extLst>
+          </p:cNvPr>
+          <p:cNvSpPr txBox="1"/>
+          <p:nvPr/>
+        </p:nvSpPr>
+        <p:spPr>
+          <a:xfrm>
+            <a:off x="7798514" y="2455522"/>
+            <a:ext cx="2866490" cy="646331"/>
+          </a:xfrm>
+          <a:prstGeom prst="rect">
+            <a:avLst/>
+          </a:prstGeom>
+          <a:noFill/>
+        </p:spPr>
+        <p:txBody>
+          <a:bodyPr wrap="square" rtlCol="0">
+            <a:spAutoFit/>
+          </a:bodyPr>
+          <a:lstStyle/>
+          <a:p>
+            <a:r>
+              <a:rPr lang="en-US" dirty="0"/>
+              <a:t>We want to add all the  the worksheet C7 value</a:t>
+            </a:r>
+          </a:p>
+        </p:txBody>
+      </p:sp>
+      <p:pic>
+        <p:nvPicPr>
+          <p:cNvPr id="12" name="Picture 11">
+            <a:extLst>
+              <a:ext uri="{FF2B5EF4-FFF2-40B4-BE49-F238E27FC236}">
+                <a16:creationId xmlns:a16="http://schemas.microsoft.com/office/drawing/2014/main" id="{F4C6689C-F299-40D4-A235-571434A0095B}"/>
+              </a:ext>
+            </a:extLst>
+          </p:cNvPr>
+          <p:cNvPicPr>
+            <a:picLocks noChangeAspect="1"/>
+          </p:cNvPicPr>
+          <p:nvPr/>
+        </p:nvPicPr>
+        <p:blipFill>
+          <a:blip r:embed="rId3"/>
+          <a:stretch>
+            <a:fillRect/>
+          </a:stretch>
+        </p:blipFill>
+        <p:spPr>
+          <a:xfrm>
+            <a:off x="6657366" y="3584404"/>
+            <a:ext cx="4007638" cy="2915725"/>
+          </a:xfrm>
+          <a:prstGeom prst="rect">
+            <a:avLst/>
+          </a:prstGeom>
+        </p:spPr>
+      </p:pic>
+      <p:cxnSp>
+        <p:nvCxnSpPr>
+          <p:cNvPr id="14" name="Straight Arrow Connector 13">
+            <a:extLst>
+              <a:ext uri="{FF2B5EF4-FFF2-40B4-BE49-F238E27FC236}">
+                <a16:creationId xmlns:a16="http://schemas.microsoft.com/office/drawing/2014/main" id="{308DB50B-4DAD-4FDF-93F3-A2A200A5CA38}"/>
+              </a:ext>
+            </a:extLst>
+          </p:cNvPr>
+          <p:cNvCxnSpPr/>
+          <p:nvPr/>
+        </p:nvCxnSpPr>
+        <p:spPr>
+          <a:xfrm flipH="1">
+            <a:off x="5815173" y="5208998"/>
+            <a:ext cx="2219218" cy="544530"/>
+          </a:xfrm>
+          <a:prstGeom prst="straightConnector1">
+            <a:avLst/>
+          </a:prstGeom>
+          <a:ln>
+            <a:tailEnd type="triangle"/>
+          </a:ln>
+        </p:spPr>
+        <p:style>
+          <a:lnRef idx="1">
+            <a:schemeClr val="accent1"/>
+          </a:lnRef>
+          <a:fillRef idx="0">
+            <a:schemeClr val="accent1"/>
+          </a:fillRef>
+          <a:effectRef idx="0">
+            <a:schemeClr val="accent1"/>
+          </a:effectRef>
+          <a:fontRef idx="minor">
+            <a:schemeClr val="tx1"/>
+          </a:fontRef>
+        </p:style>
+      </p:cxnSp>
+      <p:sp>
+        <p:nvSpPr>
+          <p:cNvPr id="15" name="TextBox 14">
+            <a:extLst>
+              <a:ext uri="{FF2B5EF4-FFF2-40B4-BE49-F238E27FC236}">
+                <a16:creationId xmlns:a16="http://schemas.microsoft.com/office/drawing/2014/main" id="{D308FA22-0A99-4D40-B833-CFB8D1D47F2B}"/>
+              </a:ext>
+            </a:extLst>
+          </p:cNvPr>
+          <p:cNvSpPr txBox="1"/>
+          <p:nvPr/>
+        </p:nvSpPr>
+        <p:spPr>
+          <a:xfrm>
+            <a:off x="437508" y="5405079"/>
+            <a:ext cx="6219858" cy="1200329"/>
+          </a:xfrm>
+          <a:prstGeom prst="rect">
+            <a:avLst/>
+          </a:prstGeom>
+          <a:noFill/>
+        </p:spPr>
+        <p:txBody>
+          <a:bodyPr wrap="square" rtlCol="0">
+            <a:spAutoFit/>
+          </a:bodyPr>
+          <a:lstStyle/>
+          <a:p>
+            <a:pPr marL="342900" indent="-342900">
+              <a:buAutoNum type="arabicParenR"/>
+            </a:pPr>
+            <a:r>
+              <a:rPr lang="en-US" dirty="0"/>
+              <a:t>Type =SUM(</a:t>
+            </a:r>
+          </a:p>
+          <a:p>
+            <a:pPr marL="342900" indent="-342900">
+              <a:buAutoNum type="arabicParenR"/>
+            </a:pPr>
+            <a:r>
+              <a:rPr lang="en-US" dirty="0"/>
+              <a:t>Click first </a:t>
+            </a:r>
+            <a:r>
+              <a:rPr lang="en-US" dirty="0" err="1"/>
+              <a:t>workshett</a:t>
+            </a:r>
+            <a:r>
+              <a:rPr lang="en-US" dirty="0"/>
+              <a:t> (Sean) C7. While holding “Shift” key ,click Carlos Worksheet. It will include all the worksheets </a:t>
+            </a:r>
+            <a:r>
+              <a:rPr lang="en-US" dirty="0" err="1"/>
+              <a:t>inbetween</a:t>
+            </a:r>
+            <a:r>
+              <a:rPr lang="en-US" dirty="0"/>
+              <a:t> (include Uma) as well</a:t>
+            </a:r>
+          </a:p>
+        </p:txBody>
+      </p:sp>
+    </p:spTree>
+    <p:extLst>
+      <p:ext uri="{BB962C8B-B14F-4D97-AF65-F5344CB8AC3E}">
+        <p14:creationId xmlns:p14="http://schemas.microsoft.com/office/powerpoint/2010/main" val="75299749"/>
+      </p:ext>
+    </p:extLst>
+  </p:cSld>
+  <p:clrMapOvr>
+    <a:masterClrMapping/>
+  </p:clrMapOvr>
+</p:sld>
+</file>
+
+<file path=ppt/slides/slide12.xml><?xml version="1.0" encoding="utf-8"?>
+<p:sld xmlns:a="http://schemas.openxmlformats.org/drawingml/2006/main" xmlns:r="http://schemas.openxmlformats.org/officeDocument/2006/relationships" xmlns:p="http://schemas.openxmlformats.org/presentationml/2006/main">
+  <p:cSld>
+    <p:spTree>
+      <p:nvGrpSpPr>
+        <p:cNvPr id="1" name=""/>
+        <p:cNvGrpSpPr/>
+        <p:nvPr/>
+      </p:nvGrpSpPr>
+      <p:grpSpPr>
+        <a:xfrm>
+          <a:off x="0" y="0"/>
+          <a:ext cx="0" cy="0"/>
+          <a:chOff x="0" y="0"/>
+          <a:chExt cx="0" cy="0"/>
+        </a:xfrm>
+      </p:grpSpPr>
+      <p:sp>
+        <p:nvSpPr>
+          <p:cNvPr id="2" name="Title 1">
+            <a:extLst>
+              <a:ext uri="{FF2B5EF4-FFF2-40B4-BE49-F238E27FC236}">
+                <a16:creationId xmlns:a16="http://schemas.microsoft.com/office/drawing/2014/main" id="{FAB30AAE-2D9E-444D-9CD0-925CD0C7FD2E}"/>
+              </a:ext>
+            </a:extLst>
+          </p:cNvPr>
+          <p:cNvSpPr>
+            <a:spLocks noGrp="1"/>
+          </p:cNvSpPr>
+          <p:nvPr>
+            <p:ph type="title"/>
+          </p:nvPr>
+        </p:nvSpPr>
+        <p:spPr/>
+        <p:txBody>
+          <a:bodyPr/>
+          <a:lstStyle/>
+          <a:p>
+            <a:endParaRPr lang="en-US"/>
+          </a:p>
+        </p:txBody>
+      </p:sp>
+      <p:sp>
+        <p:nvSpPr>
+          <p:cNvPr id="3" name="Content Placeholder 2">
+            <a:extLst>
+              <a:ext uri="{FF2B5EF4-FFF2-40B4-BE49-F238E27FC236}">
+                <a16:creationId xmlns:a16="http://schemas.microsoft.com/office/drawing/2014/main" id="{5D75F19B-D806-4925-8472-9C397F114F35}"/>
+              </a:ext>
+            </a:extLst>
+          </p:cNvPr>
+          <p:cNvSpPr>
+            <a:spLocks noGrp="1"/>
+          </p:cNvSpPr>
+          <p:nvPr>
+            <p:ph idx="1"/>
+          </p:nvPr>
+        </p:nvSpPr>
+        <p:spPr/>
+        <p:txBody>
+          <a:bodyPr/>
+          <a:lstStyle/>
+          <a:p>
+            <a:endParaRPr lang="en-US"/>
+          </a:p>
+        </p:txBody>
+      </p:sp>
+    </p:spTree>
+    <p:extLst>
+      <p:ext uri="{BB962C8B-B14F-4D97-AF65-F5344CB8AC3E}">
+        <p14:creationId xmlns:p14="http://schemas.microsoft.com/office/powerpoint/2010/main" val="1556372175"/>
       </p:ext>
     </p:extLst>
   </p:cSld>

</xml_diff>

<commit_message>
update new changes on VBA
</commit_message>
<xml_diff>
--- a/ExcelEssentialSkills.pptx
+++ b/ExcelEssentialSkills.pptx
@@ -17,6 +17,7 @@
     <p:sldId id="264" r:id="rId11"/>
     <p:sldId id="266" r:id="rId12"/>
     <p:sldId id="267" r:id="rId13"/>
+    <p:sldId id="268" r:id="rId14"/>
   </p:sldIdLst>
   <p:sldSz cx="12192000" cy="6858000"/>
   <p:notesSz cx="6858000" cy="9144000"/>
@@ -270,7 +271,7 @@
           <a:p>
             <a:fld id="{09C4AEFE-B11D-49B4-8BEA-502C998A1E51}" type="datetimeFigureOut">
               <a:rPr lang="en-US" smtClean="0"/>
-              <a:t>1/5/2022</a:t>
+              <a:t>1/7/2022</a:t>
             </a:fld>
             <a:endParaRPr lang="en-US"/>
           </a:p>
@@ -468,7 +469,7 @@
           <a:p>
             <a:fld id="{09C4AEFE-B11D-49B4-8BEA-502C998A1E51}" type="datetimeFigureOut">
               <a:rPr lang="en-US" smtClean="0"/>
-              <a:t>1/5/2022</a:t>
+              <a:t>1/7/2022</a:t>
             </a:fld>
             <a:endParaRPr lang="en-US"/>
           </a:p>
@@ -676,7 +677,7 @@
           <a:p>
             <a:fld id="{09C4AEFE-B11D-49B4-8BEA-502C998A1E51}" type="datetimeFigureOut">
               <a:rPr lang="en-US" smtClean="0"/>
-              <a:t>1/5/2022</a:t>
+              <a:t>1/7/2022</a:t>
             </a:fld>
             <a:endParaRPr lang="en-US"/>
           </a:p>
@@ -874,7 +875,7 @@
           <a:p>
             <a:fld id="{09C4AEFE-B11D-49B4-8BEA-502C998A1E51}" type="datetimeFigureOut">
               <a:rPr lang="en-US" smtClean="0"/>
-              <a:t>1/5/2022</a:t>
+              <a:t>1/7/2022</a:t>
             </a:fld>
             <a:endParaRPr lang="en-US"/>
           </a:p>
@@ -1149,7 +1150,7 @@
           <a:p>
             <a:fld id="{09C4AEFE-B11D-49B4-8BEA-502C998A1E51}" type="datetimeFigureOut">
               <a:rPr lang="en-US" smtClean="0"/>
-              <a:t>1/5/2022</a:t>
+              <a:t>1/7/2022</a:t>
             </a:fld>
             <a:endParaRPr lang="en-US"/>
           </a:p>
@@ -1414,7 +1415,7 @@
           <a:p>
             <a:fld id="{09C4AEFE-B11D-49B4-8BEA-502C998A1E51}" type="datetimeFigureOut">
               <a:rPr lang="en-US" smtClean="0"/>
-              <a:t>1/5/2022</a:t>
+              <a:t>1/7/2022</a:t>
             </a:fld>
             <a:endParaRPr lang="en-US"/>
           </a:p>
@@ -1826,7 +1827,7 @@
           <a:p>
             <a:fld id="{09C4AEFE-B11D-49B4-8BEA-502C998A1E51}" type="datetimeFigureOut">
               <a:rPr lang="en-US" smtClean="0"/>
-              <a:t>1/5/2022</a:t>
+              <a:t>1/7/2022</a:t>
             </a:fld>
             <a:endParaRPr lang="en-US"/>
           </a:p>
@@ -1967,7 +1968,7 @@
           <a:p>
             <a:fld id="{09C4AEFE-B11D-49B4-8BEA-502C998A1E51}" type="datetimeFigureOut">
               <a:rPr lang="en-US" smtClean="0"/>
-              <a:t>1/5/2022</a:t>
+              <a:t>1/7/2022</a:t>
             </a:fld>
             <a:endParaRPr lang="en-US"/>
           </a:p>
@@ -2080,7 +2081,7 @@
           <a:p>
             <a:fld id="{09C4AEFE-B11D-49B4-8BEA-502C998A1E51}" type="datetimeFigureOut">
               <a:rPr lang="en-US" smtClean="0"/>
-              <a:t>1/5/2022</a:t>
+              <a:t>1/7/2022</a:t>
             </a:fld>
             <a:endParaRPr lang="en-US"/>
           </a:p>
@@ -2391,7 +2392,7 @@
           <a:p>
             <a:fld id="{09C4AEFE-B11D-49B4-8BEA-502C998A1E51}" type="datetimeFigureOut">
               <a:rPr lang="en-US" smtClean="0"/>
-              <a:t>1/5/2022</a:t>
+              <a:t>1/7/2022</a:t>
             </a:fld>
             <a:endParaRPr lang="en-US"/>
           </a:p>
@@ -2679,7 +2680,7 @@
           <a:p>
             <a:fld id="{09C4AEFE-B11D-49B4-8BEA-502C998A1E51}" type="datetimeFigureOut">
               <a:rPr lang="en-US" smtClean="0"/>
-              <a:t>1/5/2022</a:t>
+              <a:t>1/7/2022</a:t>
             </a:fld>
             <a:endParaRPr lang="en-US"/>
           </a:p>
@@ -2920,7 +2921,7 @@
           <a:p>
             <a:fld id="{09C4AEFE-B11D-49B4-8BEA-502C998A1E51}" type="datetimeFigureOut">
               <a:rPr lang="en-US" smtClean="0"/>
-              <a:t>1/5/2022</a:t>
+              <a:t>1/7/2022</a:t>
             </a:fld>
             <a:endParaRPr lang="en-US"/>
           </a:p>
@@ -3934,37 +3935,207 @@
             <p:ph type="title"/>
           </p:nvPr>
         </p:nvSpPr>
-        <p:spPr/>
-        <p:txBody>
-          <a:bodyPr/>
-          <a:lstStyle/>
-          <a:p>
-            <a:endParaRPr lang="en-US"/>
-          </a:p>
-        </p:txBody>
-      </p:sp>
-      <p:sp>
-        <p:nvSpPr>
-          <p:cNvPr id="3" name="Content Placeholder 2">
-            <a:extLst>
-              <a:ext uri="{FF2B5EF4-FFF2-40B4-BE49-F238E27FC236}">
-                <a16:creationId xmlns:a16="http://schemas.microsoft.com/office/drawing/2014/main" id="{5D75F19B-D806-4925-8472-9C397F114F35}"/>
-              </a:ext>
-            </a:extLst>
-          </p:cNvPr>
-          <p:cNvSpPr>
-            <a:spLocks noGrp="1"/>
-          </p:cNvSpPr>
+        <p:spPr>
+          <a:xfrm>
+            <a:off x="626724" y="365126"/>
+            <a:ext cx="10727076" cy="775306"/>
+          </a:xfrm>
+        </p:spPr>
+        <p:txBody>
+          <a:bodyPr>
+            <a:normAutofit fontScale="90000"/>
+          </a:bodyPr>
+          <a:lstStyle/>
+          <a:p>
+            <a:r>
+              <a:rPr lang="en-US" dirty="0"/>
+              <a:t>Consolidate (consolidate data from diff workbook to the current workbook)</a:t>
+            </a:r>
+          </a:p>
+        </p:txBody>
+      </p:sp>
+      <p:pic>
+        <p:nvPicPr>
+          <p:cNvPr id="5" name="Content Placeholder 4">
+            <a:extLst>
+              <a:ext uri="{FF2B5EF4-FFF2-40B4-BE49-F238E27FC236}">
+                <a16:creationId xmlns:a16="http://schemas.microsoft.com/office/drawing/2014/main" id="{B0840686-E52B-4766-980B-3E700CE43582}"/>
+              </a:ext>
+            </a:extLst>
+          </p:cNvPr>
+          <p:cNvPicPr>
+            <a:picLocks noGrp="1" noChangeAspect="1"/>
+          </p:cNvPicPr>
           <p:nvPr>
             <p:ph idx="1"/>
           </p:nvPr>
-        </p:nvSpPr>
-        <p:spPr/>
-        <p:txBody>
-          <a:bodyPr/>
-          <a:lstStyle/>
-          <a:p>
-            <a:endParaRPr lang="en-US"/>
+        </p:nvPicPr>
+        <p:blipFill>
+          <a:blip r:embed="rId2"/>
+          <a:stretch>
+            <a:fillRect/>
+          </a:stretch>
+        </p:blipFill>
+        <p:spPr>
+          <a:xfrm>
+            <a:off x="811658" y="2552655"/>
+            <a:ext cx="7296949" cy="3798969"/>
+          </a:xfrm>
+        </p:spPr>
+      </p:pic>
+      <p:cxnSp>
+        <p:nvCxnSpPr>
+          <p:cNvPr id="7" name="Straight Arrow Connector 6">
+            <a:extLst>
+              <a:ext uri="{FF2B5EF4-FFF2-40B4-BE49-F238E27FC236}">
+                <a16:creationId xmlns:a16="http://schemas.microsoft.com/office/drawing/2014/main" id="{807D7ACB-7FF7-490C-BC3D-9D3E81ED5FB4}"/>
+              </a:ext>
+            </a:extLst>
+          </p:cNvPr>
+          <p:cNvCxnSpPr/>
+          <p:nvPr/>
+        </p:nvCxnSpPr>
+        <p:spPr>
+          <a:xfrm flipV="1">
+            <a:off x="7633699" y="4859676"/>
+            <a:ext cx="1500027" cy="215758"/>
+          </a:xfrm>
+          <a:prstGeom prst="straightConnector1">
+            <a:avLst/>
+          </a:prstGeom>
+          <a:ln>
+            <a:tailEnd type="triangle"/>
+          </a:ln>
+        </p:spPr>
+        <p:style>
+          <a:lnRef idx="1">
+            <a:schemeClr val="accent1"/>
+          </a:lnRef>
+          <a:fillRef idx="0">
+            <a:schemeClr val="accent1"/>
+          </a:fillRef>
+          <a:effectRef idx="0">
+            <a:schemeClr val="accent1"/>
+          </a:effectRef>
+          <a:fontRef idx="minor">
+            <a:schemeClr val="tx1"/>
+          </a:fontRef>
+        </p:style>
+      </p:cxnSp>
+      <p:sp>
+        <p:nvSpPr>
+          <p:cNvPr id="8" name="TextBox 7">
+            <a:extLst>
+              <a:ext uri="{FF2B5EF4-FFF2-40B4-BE49-F238E27FC236}">
+                <a16:creationId xmlns:a16="http://schemas.microsoft.com/office/drawing/2014/main" id="{E6C9345B-F492-4617-B54E-C2F67A62C4B8}"/>
+              </a:ext>
+            </a:extLst>
+          </p:cNvPr>
+          <p:cNvSpPr txBox="1"/>
+          <p:nvPr/>
+        </p:nvSpPr>
+        <p:spPr>
+          <a:xfrm>
+            <a:off x="9133726" y="4592548"/>
+            <a:ext cx="2095928" cy="646331"/>
+          </a:xfrm>
+          <a:prstGeom prst="rect">
+            <a:avLst/>
+          </a:prstGeom>
+          <a:noFill/>
+        </p:spPr>
+        <p:txBody>
+          <a:bodyPr wrap="square" rtlCol="0">
+            <a:spAutoFit/>
+          </a:bodyPr>
+          <a:lstStyle/>
+          <a:p>
+            <a:r>
+              <a:rPr lang="en-US" dirty="0"/>
+              <a:t>Data-&gt; </a:t>
+            </a:r>
+            <a:r>
+              <a:rPr lang="en-US" dirty="0" err="1"/>
+              <a:t>datatools</a:t>
+            </a:r>
+            <a:r>
+              <a:rPr lang="en-US" dirty="0"/>
+              <a:t>-&gt; consolidate </a:t>
+            </a:r>
+          </a:p>
+        </p:txBody>
+      </p:sp>
+      <p:cxnSp>
+        <p:nvCxnSpPr>
+          <p:cNvPr id="10" name="Straight Arrow Connector 9">
+            <a:extLst>
+              <a:ext uri="{FF2B5EF4-FFF2-40B4-BE49-F238E27FC236}">
+                <a16:creationId xmlns:a16="http://schemas.microsoft.com/office/drawing/2014/main" id="{23B1B1B9-C0F4-4E1B-B64E-AF494059F058}"/>
+              </a:ext>
+            </a:extLst>
+          </p:cNvPr>
+          <p:cNvCxnSpPr/>
+          <p:nvPr/>
+        </p:nvCxnSpPr>
+        <p:spPr>
+          <a:xfrm flipV="1">
+            <a:off x="7294652" y="1972638"/>
+            <a:ext cx="813955" cy="580017"/>
+          </a:xfrm>
+          <a:prstGeom prst="straightConnector1">
+            <a:avLst/>
+          </a:prstGeom>
+          <a:ln>
+            <a:tailEnd type="triangle"/>
+          </a:ln>
+        </p:spPr>
+        <p:style>
+          <a:lnRef idx="1">
+            <a:schemeClr val="accent1"/>
+          </a:lnRef>
+          <a:fillRef idx="0">
+            <a:schemeClr val="accent1"/>
+          </a:fillRef>
+          <a:effectRef idx="0">
+            <a:schemeClr val="accent1"/>
+          </a:effectRef>
+          <a:fontRef idx="minor">
+            <a:schemeClr val="tx1"/>
+          </a:fontRef>
+        </p:style>
+      </p:cxnSp>
+      <p:sp>
+        <p:nvSpPr>
+          <p:cNvPr id="11" name="TextBox 10">
+            <a:extLst>
+              <a:ext uri="{FF2B5EF4-FFF2-40B4-BE49-F238E27FC236}">
+                <a16:creationId xmlns:a16="http://schemas.microsoft.com/office/drawing/2014/main" id="{34596D0F-8386-4513-9FBE-18A185C5363F}"/>
+              </a:ext>
+            </a:extLst>
+          </p:cNvPr>
+          <p:cNvSpPr txBox="1"/>
+          <p:nvPr/>
+        </p:nvSpPr>
+        <p:spPr>
+          <a:xfrm>
+            <a:off x="8172548" y="1520575"/>
+            <a:ext cx="4019452" cy="923330"/>
+          </a:xfrm>
+          <a:prstGeom prst="rect">
+            <a:avLst/>
+          </a:prstGeom>
+          <a:noFill/>
+        </p:spPr>
+        <p:txBody>
+          <a:bodyPr wrap="square" rtlCol="0">
+            <a:spAutoFit/>
+          </a:bodyPr>
+          <a:lstStyle/>
+          <a:p>
+            <a:r>
+              <a:rPr lang="en-US" dirty="0"/>
+              <a:t>Open all the workbooks and put them side by side : “View”-&gt;”arrange all” -&gt; “Tiled”</a:t>
+            </a:r>
           </a:p>
         </p:txBody>
       </p:sp>
@@ -3972,6 +4143,172 @@
     <p:extLst>
       <p:ext uri="{BB962C8B-B14F-4D97-AF65-F5344CB8AC3E}">
         <p14:creationId xmlns:p14="http://schemas.microsoft.com/office/powerpoint/2010/main" val="1556372175"/>
+      </p:ext>
+    </p:extLst>
+  </p:cSld>
+  <p:clrMapOvr>
+    <a:masterClrMapping/>
+  </p:clrMapOvr>
+</p:sld>
+</file>
+
+<file path=ppt/slides/slide13.xml><?xml version="1.0" encoding="utf-8"?>
+<p:sld xmlns:a="http://schemas.openxmlformats.org/drawingml/2006/main" xmlns:r="http://schemas.openxmlformats.org/officeDocument/2006/relationships" xmlns:p="http://schemas.openxmlformats.org/presentationml/2006/main">
+  <p:cSld>
+    <p:spTree>
+      <p:nvGrpSpPr>
+        <p:cNvPr id="1" name=""/>
+        <p:cNvGrpSpPr/>
+        <p:nvPr/>
+      </p:nvGrpSpPr>
+      <p:grpSpPr>
+        <a:xfrm>
+          <a:off x="0" y="0"/>
+          <a:ext cx="0" cy="0"/>
+          <a:chOff x="0" y="0"/>
+          <a:chExt cx="0" cy="0"/>
+        </a:xfrm>
+      </p:grpSpPr>
+      <p:sp>
+        <p:nvSpPr>
+          <p:cNvPr id="2" name="Title 1">
+            <a:extLst>
+              <a:ext uri="{FF2B5EF4-FFF2-40B4-BE49-F238E27FC236}">
+                <a16:creationId xmlns:a16="http://schemas.microsoft.com/office/drawing/2014/main" id="{EC49CFF7-FC81-4FC2-95BE-218DCC710725}"/>
+              </a:ext>
+            </a:extLst>
+          </p:cNvPr>
+          <p:cNvSpPr>
+            <a:spLocks noGrp="1"/>
+          </p:cNvSpPr>
+          <p:nvPr>
+            <p:ph type="title"/>
+          </p:nvPr>
+        </p:nvSpPr>
+        <p:spPr>
+          <a:xfrm>
+            <a:off x="838200" y="365126"/>
+            <a:ext cx="10515600" cy="888322"/>
+          </a:xfrm>
+        </p:spPr>
+        <p:txBody>
+          <a:bodyPr/>
+          <a:lstStyle/>
+          <a:p>
+            <a:r>
+              <a:rPr lang="en-US" dirty="0"/>
+              <a:t>Continue…</a:t>
+            </a:r>
+          </a:p>
+        </p:txBody>
+      </p:sp>
+      <p:pic>
+        <p:nvPicPr>
+          <p:cNvPr id="5" name="Content Placeholder 4">
+            <a:extLst>
+              <a:ext uri="{FF2B5EF4-FFF2-40B4-BE49-F238E27FC236}">
+                <a16:creationId xmlns:a16="http://schemas.microsoft.com/office/drawing/2014/main" id="{5118465E-5224-4E54-B09D-C519A0E88C7D}"/>
+              </a:ext>
+            </a:extLst>
+          </p:cNvPr>
+          <p:cNvPicPr>
+            <a:picLocks noGrp="1" noChangeAspect="1"/>
+          </p:cNvPicPr>
+          <p:nvPr>
+            <p:ph idx="1"/>
+          </p:nvPr>
+        </p:nvPicPr>
+        <p:blipFill>
+          <a:blip r:embed="rId2"/>
+          <a:stretch>
+            <a:fillRect/>
+          </a:stretch>
+        </p:blipFill>
+        <p:spPr>
+          <a:xfrm>
+            <a:off x="462713" y="1763980"/>
+            <a:ext cx="8492551" cy="4351338"/>
+          </a:xfrm>
+        </p:spPr>
+      </p:pic>
+      <p:cxnSp>
+        <p:nvCxnSpPr>
+          <p:cNvPr id="7" name="Straight Arrow Connector 6">
+            <a:extLst>
+              <a:ext uri="{FF2B5EF4-FFF2-40B4-BE49-F238E27FC236}">
+                <a16:creationId xmlns:a16="http://schemas.microsoft.com/office/drawing/2014/main" id="{A26138C5-0C94-4B2A-BD7B-53786B839B65}"/>
+              </a:ext>
+            </a:extLst>
+          </p:cNvPr>
+          <p:cNvCxnSpPr/>
+          <p:nvPr/>
+        </p:nvCxnSpPr>
+        <p:spPr>
+          <a:xfrm flipV="1">
+            <a:off x="8188503" y="2188396"/>
+            <a:ext cx="1705510" cy="801384"/>
+          </a:xfrm>
+          <a:prstGeom prst="straightConnector1">
+            <a:avLst/>
+          </a:prstGeom>
+          <a:ln>
+            <a:tailEnd type="triangle"/>
+          </a:ln>
+        </p:spPr>
+        <p:style>
+          <a:lnRef idx="1">
+            <a:schemeClr val="accent1"/>
+          </a:lnRef>
+          <a:fillRef idx="0">
+            <a:schemeClr val="accent1"/>
+          </a:fillRef>
+          <a:effectRef idx="0">
+            <a:schemeClr val="accent1"/>
+          </a:effectRef>
+          <a:fontRef idx="minor">
+            <a:schemeClr val="tx1"/>
+          </a:fontRef>
+        </p:style>
+      </p:cxnSp>
+      <p:sp>
+        <p:nvSpPr>
+          <p:cNvPr id="8" name="TextBox 7">
+            <a:extLst>
+              <a:ext uri="{FF2B5EF4-FFF2-40B4-BE49-F238E27FC236}">
+                <a16:creationId xmlns:a16="http://schemas.microsoft.com/office/drawing/2014/main" id="{BB5C919D-B46F-49EB-BA86-0790E3E359E1}"/>
+              </a:ext>
+            </a:extLst>
+          </p:cNvPr>
+          <p:cNvSpPr txBox="1"/>
+          <p:nvPr/>
+        </p:nvSpPr>
+        <p:spPr>
+          <a:xfrm>
+            <a:off x="10007029" y="1880171"/>
+            <a:ext cx="1921268" cy="923330"/>
+          </a:xfrm>
+          <a:prstGeom prst="rect">
+            <a:avLst/>
+          </a:prstGeom>
+          <a:noFill/>
+        </p:spPr>
+        <p:txBody>
+          <a:bodyPr wrap="square" rtlCol="0">
+            <a:spAutoFit/>
+          </a:bodyPr>
+          <a:lstStyle/>
+          <a:p>
+            <a:r>
+              <a:rPr lang="en-US" dirty="0"/>
+              <a:t>Select data range from diff workbooks</a:t>
+            </a:r>
+          </a:p>
+        </p:txBody>
+      </p:sp>
+    </p:spTree>
+    <p:extLst>
+      <p:ext uri="{BB962C8B-B14F-4D97-AF65-F5344CB8AC3E}">
+        <p14:creationId xmlns:p14="http://schemas.microsoft.com/office/powerpoint/2010/main" val="2679248360"/>
       </p:ext>
     </p:extLst>
   </p:cSld>

</xml_diff>